<commit_message>
docs: Update 5.2.2, 5.3 Regularization, Hyperparameters, Validation Sets.pptx
</commit_message>
<xml_diff>
--- a/files/ppt/5.2.2, 5.3 Regularization, Hyperparameters, Validation Sets,.pptx
+++ b/files/ppt/5.2.2, 5.3 Regularization, Hyperparameters, Validation Sets,.pptx
@@ -5,31 +5,30 @@
     <p:sldMasterId id="2147483696" r:id="rId1"/>
   </p:sldMasterIdLst>
   <p:notesMasterIdLst>
-    <p:notesMasterId r:id="rId21"/>
+    <p:notesMasterId r:id="rId20"/>
   </p:notesMasterIdLst>
   <p:handoutMasterIdLst>
-    <p:handoutMasterId r:id="rId22"/>
+    <p:handoutMasterId r:id="rId21"/>
   </p:handoutMasterIdLst>
   <p:sldIdLst>
     <p:sldId id="257" r:id="rId2"/>
     <p:sldId id="259" r:id="rId3"/>
-    <p:sldId id="260" r:id="rId4"/>
-    <p:sldId id="271" r:id="rId5"/>
-    <p:sldId id="272" r:id="rId6"/>
-    <p:sldId id="276" r:id="rId7"/>
-    <p:sldId id="261" r:id="rId8"/>
-    <p:sldId id="274" r:id="rId9"/>
-    <p:sldId id="275" r:id="rId10"/>
-    <p:sldId id="273" r:id="rId11"/>
-    <p:sldId id="262" r:id="rId12"/>
+    <p:sldId id="271" r:id="rId4"/>
+    <p:sldId id="272" r:id="rId5"/>
+    <p:sldId id="276" r:id="rId6"/>
+    <p:sldId id="261" r:id="rId7"/>
+    <p:sldId id="274" r:id="rId8"/>
+    <p:sldId id="275" r:id="rId9"/>
+    <p:sldId id="273" r:id="rId10"/>
+    <p:sldId id="277" r:id="rId11"/>
+    <p:sldId id="264" r:id="rId12"/>
     <p:sldId id="263" r:id="rId13"/>
-    <p:sldId id="264" r:id="rId14"/>
-    <p:sldId id="265" r:id="rId15"/>
-    <p:sldId id="266" r:id="rId16"/>
-    <p:sldId id="267" r:id="rId17"/>
-    <p:sldId id="268" r:id="rId18"/>
-    <p:sldId id="269" r:id="rId19"/>
-    <p:sldId id="270" r:id="rId20"/>
+    <p:sldId id="278" r:id="rId14"/>
+    <p:sldId id="279" r:id="rId15"/>
+    <p:sldId id="280" r:id="rId16"/>
+    <p:sldId id="282" r:id="rId17"/>
+    <p:sldId id="281" r:id="rId18"/>
+    <p:sldId id="283" r:id="rId19"/>
   </p:sldIdLst>
   <p:sldSz cx="12192000" cy="6858000"/>
   <p:notesSz cx="6858000" cy="9144000"/>
@@ -248,7 +247,7 @@
               <a:rPr lang="ko-KR" altLang="en-US" smtClean="0">
                 <a:latin typeface="맑은 고딕" panose="020B0503020000020004" pitchFamily="50" charset="-127"/>
               </a:rPr>
-              <a:t>2021년 1월 26일</a:t>
+              <a:t>2021년 1월 27일</a:t>
             </a:fld>
             <a:endParaRPr lang="ko-KR" altLang="en-US" dirty="0">
               <a:latin typeface="맑은 고딕" panose="020B0503020000020004" pitchFamily="50" charset="-127"/>
@@ -428,7 +427,7 @@
             <a:fld id="{258C430E-8468-4F52-A66F-3CC625A80D37}" type="datetime4">
               <a:rPr lang="ko-KR" altLang="en-US" smtClean="0"/>
               <a:pPr/>
-              <a:t>2021년 1월 26일</a:t>
+              <a:t>2021년 1월 27일</a:t>
             </a:fld>
             <a:endParaRPr lang="ko-KR" altLang="en-US" dirty="0"/>
           </a:p>
@@ -866,7 +865,7 @@
     </p:spTree>
     <p:extLst>
       <p:ext uri="{BB962C8B-B14F-4D97-AF65-F5344CB8AC3E}">
-        <p14:creationId xmlns:p14="http://schemas.microsoft.com/office/powerpoint/2010/main" val="1898085462"/>
+        <p14:creationId xmlns:p14="http://schemas.microsoft.com/office/powerpoint/2010/main" val="2022518190"/>
       </p:ext>
     </p:extLst>
   </p:cSld>
@@ -951,7 +950,7 @@
     </p:spTree>
     <p:extLst>
       <p:ext uri="{BB962C8B-B14F-4D97-AF65-F5344CB8AC3E}">
-        <p14:creationId xmlns:p14="http://schemas.microsoft.com/office/powerpoint/2010/main" val="4169753374"/>
+        <p14:creationId xmlns:p14="http://schemas.microsoft.com/office/powerpoint/2010/main" val="828055315"/>
       </p:ext>
     </p:extLst>
   </p:cSld>
@@ -1088,10 +1087,11 @@
         </p:nvSpPr>
         <p:spPr/>
         <p:txBody>
-          <a:bodyPr/>
-          <a:lstStyle/>
-          <a:p>
-            <a:endParaRPr lang="ko-KR" altLang="en-US"/>
+          <a:bodyPr rtlCol="0"/>
+          <a:lstStyle/>
+          <a:p>
+            <a:pPr rtl="0"/>
+            <a:endParaRPr lang="ko-KR" altLang="en-US" dirty="0"/>
           </a:p>
         </p:txBody>
       </p:sp>
@@ -1107,11 +1107,11 @@
         </p:nvSpPr>
         <p:spPr/>
         <p:txBody>
-          <a:bodyPr/>
-          <a:lstStyle/>
-          <a:p>
-            <a:pPr rtl="0"/>
-            <a:fld id="{32674CE4-FBD8-4481-AEFB-CA53E599A745}" type="slidenum">
+          <a:bodyPr rtlCol="0"/>
+          <a:lstStyle/>
+          <a:p>
+            <a:pPr rtl="0"/>
+            <a:fld id="{5800B302-F4DC-4547-9C74-CF794137D166}" type="slidenum">
               <a:rPr lang="en-US" altLang="ko-KR" smtClean="0"/>
               <a:t>13</a:t>
             </a:fld>
@@ -1122,7 +1122,7 @@
     </p:spTree>
     <p:extLst>
       <p:ext uri="{BB962C8B-B14F-4D97-AF65-F5344CB8AC3E}">
-        <p14:creationId xmlns:p14="http://schemas.microsoft.com/office/powerpoint/2010/main" val="828055315"/>
+        <p14:creationId xmlns:p14="http://schemas.microsoft.com/office/powerpoint/2010/main" val="460102217"/>
       </p:ext>
     </p:extLst>
   </p:cSld>
@@ -1207,7 +1207,7 @@
     </p:spTree>
     <p:extLst>
       <p:ext uri="{BB962C8B-B14F-4D97-AF65-F5344CB8AC3E}">
-        <p14:creationId xmlns:p14="http://schemas.microsoft.com/office/powerpoint/2010/main" val="2443595640"/>
+        <p14:creationId xmlns:p14="http://schemas.microsoft.com/office/powerpoint/2010/main" val="3924113548"/>
       </p:ext>
     </p:extLst>
   </p:cSld>
@@ -1292,7 +1292,7 @@
     </p:spTree>
     <p:extLst>
       <p:ext uri="{BB962C8B-B14F-4D97-AF65-F5344CB8AC3E}">
-        <p14:creationId xmlns:p14="http://schemas.microsoft.com/office/powerpoint/2010/main" val="3083880086"/>
+        <p14:creationId xmlns:p14="http://schemas.microsoft.com/office/powerpoint/2010/main" val="2692285871"/>
       </p:ext>
     </p:extLst>
   </p:cSld>
@@ -1377,7 +1377,7 @@
     </p:spTree>
     <p:extLst>
       <p:ext uri="{BB962C8B-B14F-4D97-AF65-F5344CB8AC3E}">
-        <p14:creationId xmlns:p14="http://schemas.microsoft.com/office/powerpoint/2010/main" val="478004735"/>
+        <p14:creationId xmlns:p14="http://schemas.microsoft.com/office/powerpoint/2010/main" val="813766088"/>
       </p:ext>
     </p:extLst>
   </p:cSld>
@@ -1462,7 +1462,7 @@
     </p:spTree>
     <p:extLst>
       <p:ext uri="{BB962C8B-B14F-4D97-AF65-F5344CB8AC3E}">
-        <p14:creationId xmlns:p14="http://schemas.microsoft.com/office/powerpoint/2010/main" val="815272495"/>
+        <p14:creationId xmlns:p14="http://schemas.microsoft.com/office/powerpoint/2010/main" val="3980383527"/>
       </p:ext>
     </p:extLst>
   </p:cSld>
@@ -1513,10 +1513,11 @@
         </p:nvSpPr>
         <p:spPr/>
         <p:txBody>
-          <a:bodyPr/>
-          <a:lstStyle/>
-          <a:p>
-            <a:endParaRPr lang="ko-KR" altLang="en-US"/>
+          <a:bodyPr rtlCol="0"/>
+          <a:lstStyle/>
+          <a:p>
+            <a:pPr rtl="0"/>
+            <a:endParaRPr lang="ko-KR" altLang="en-US" dirty="0"/>
           </a:p>
         </p:txBody>
       </p:sp>
@@ -1532,7 +1533,7 @@
         </p:nvSpPr>
         <p:spPr/>
         <p:txBody>
-          <a:bodyPr/>
+          <a:bodyPr rtlCol="0"/>
           <a:lstStyle/>
           <a:p>
             <a:pPr rtl="0"/>
@@ -1547,92 +1548,7 @@
     </p:spTree>
     <p:extLst>
       <p:ext uri="{BB962C8B-B14F-4D97-AF65-F5344CB8AC3E}">
-        <p14:creationId xmlns:p14="http://schemas.microsoft.com/office/powerpoint/2010/main" val="1424161248"/>
-      </p:ext>
-    </p:extLst>
-  </p:cSld>
-  <p:clrMapOvr>
-    <a:masterClrMapping/>
-  </p:clrMapOvr>
-</p:notes>
-</file>
-
-<file path=ppt/notesSlides/notesSlide19.xml><?xml version="1.0" encoding="utf-8"?>
-<p:notes xmlns:a="http://schemas.openxmlformats.org/drawingml/2006/main" xmlns:r="http://schemas.openxmlformats.org/officeDocument/2006/relationships" xmlns:p="http://schemas.openxmlformats.org/presentationml/2006/main">
-  <p:cSld>
-    <p:spTree>
-      <p:nvGrpSpPr>
-        <p:cNvPr id="1" name=""/>
-        <p:cNvGrpSpPr/>
-        <p:nvPr/>
-      </p:nvGrpSpPr>
-      <p:grpSpPr>
-        <a:xfrm>
-          <a:off x="0" y="0"/>
-          <a:ext cx="0" cy="0"/>
-          <a:chOff x="0" y="0"/>
-          <a:chExt cx="0" cy="0"/>
-        </a:xfrm>
-      </p:grpSpPr>
-      <p:sp>
-        <p:nvSpPr>
-          <p:cNvPr id="2" name="슬라이드 이미지 개체 틀 1"/>
-          <p:cNvSpPr>
-            <a:spLocks noGrp="1" noRot="1" noChangeAspect="1"/>
-          </p:cNvSpPr>
-          <p:nvPr>
-            <p:ph type="sldImg"/>
-          </p:nvPr>
-        </p:nvSpPr>
-        <p:spPr/>
-      </p:sp>
-      <p:sp>
-        <p:nvSpPr>
-          <p:cNvPr id="3" name="슬라이드 노트 개체 틀 2"/>
-          <p:cNvSpPr>
-            <a:spLocks noGrp="1"/>
-          </p:cNvSpPr>
-          <p:nvPr>
-            <p:ph type="body" idx="1"/>
-          </p:nvPr>
-        </p:nvSpPr>
-        <p:spPr/>
-        <p:txBody>
-          <a:bodyPr/>
-          <a:lstStyle/>
-          <a:p>
-            <a:endParaRPr lang="ko-KR" altLang="en-US"/>
-          </a:p>
-        </p:txBody>
-      </p:sp>
-      <p:sp>
-        <p:nvSpPr>
-          <p:cNvPr id="4" name="슬라이드 번호 개체 틀 3"/>
-          <p:cNvSpPr>
-            <a:spLocks noGrp="1"/>
-          </p:cNvSpPr>
-          <p:nvPr>
-            <p:ph type="sldNum" sz="quarter" idx="10"/>
-          </p:nvPr>
-        </p:nvSpPr>
-        <p:spPr/>
-        <p:txBody>
-          <a:bodyPr/>
-          <a:lstStyle/>
-          <a:p>
-            <a:pPr rtl="0"/>
-            <a:fld id="{32674CE4-FBD8-4481-AEFB-CA53E599A745}" type="slidenum">
-              <a:rPr lang="en-US" altLang="ko-KR" smtClean="0"/>
-              <a:t>19</a:t>
-            </a:fld>
-            <a:endParaRPr lang="ko-KR" altLang="en-US" dirty="0"/>
-          </a:p>
-        </p:txBody>
-      </p:sp>
-    </p:spTree>
-    <p:extLst>
-      <p:ext uri="{BB962C8B-B14F-4D97-AF65-F5344CB8AC3E}">
-        <p14:creationId xmlns:p14="http://schemas.microsoft.com/office/powerpoint/2010/main" val="2081811235"/>
+        <p14:creationId xmlns:p14="http://schemas.microsoft.com/office/powerpoint/2010/main" val="4241753082"/>
       </p:ext>
     </p:extLst>
   </p:cSld>
@@ -1898,7 +1814,7 @@
     </p:spTree>
     <p:extLst>
       <p:ext uri="{BB962C8B-B14F-4D97-AF65-F5344CB8AC3E}">
-        <p14:creationId xmlns:p14="http://schemas.microsoft.com/office/powerpoint/2010/main" val="3069441310"/>
+        <p14:creationId xmlns:p14="http://schemas.microsoft.com/office/powerpoint/2010/main" val="4206498380"/>
       </p:ext>
     </p:extLst>
   </p:cSld>
@@ -2069,7 +1985,7 @@
     </p:spTree>
     <p:extLst>
       <p:ext uri="{BB962C8B-B14F-4D97-AF65-F5344CB8AC3E}">
-        <p14:creationId xmlns:p14="http://schemas.microsoft.com/office/powerpoint/2010/main" val="4206498380"/>
+        <p14:creationId xmlns:p14="http://schemas.microsoft.com/office/powerpoint/2010/main" val="3522640352"/>
       </p:ext>
     </p:extLst>
   </p:cSld>
@@ -2120,96 +2036,10 @@
         </p:nvSpPr>
         <p:spPr/>
         <p:txBody>
-          <a:bodyPr rtlCol="0"/>
-          <a:lstStyle/>
-          <a:p>
-            <a:pPr rtl="0"/>
-            <a:r>
-              <a:rPr lang="ko-KR" altLang="en-US" b="1" dirty="0">
-                <a:ea typeface="맑은 고딕" panose="020B0503020000020004" pitchFamily="50" charset="-127"/>
-              </a:rPr>
-              <a:t>목표 예</a:t>
-            </a:r>
-          </a:p>
-          <a:p>
-            <a:pPr marL="0" indent="0" rtl="0">
-              <a:buFont typeface="Arial" panose="020B0604020202020204" pitchFamily="34" charset="0"/>
-              <a:buNone/>
-            </a:pPr>
-            <a:r>
-              <a:rPr lang="ko-KR" altLang="en-US" dirty="0">
-                <a:ea typeface="맑은 고딕" panose="020B0503020000020004" pitchFamily="50" charset="-127"/>
-              </a:rPr>
-              <a:t>이 단원을 마치면 다음을 수행할 수 있습니다</a:t>
-            </a:r>
-            <a:r>
-              <a:rPr lang="en-US" altLang="ko-KR" dirty="0">
-                <a:ea typeface="맑은 고딕" panose="020B0503020000020004" pitchFamily="50" charset="-127"/>
-              </a:rPr>
-              <a:t>.</a:t>
-            </a:r>
-          </a:p>
-          <a:p>
-            <a:pPr marL="171450" indent="-171450" rtl="0">
-              <a:buFont typeface="Arial" panose="020B0604020202020204" pitchFamily="34" charset="0"/>
-              <a:buChar char="•"/>
-            </a:pPr>
-            <a:r>
-              <a:rPr lang="ko-KR" altLang="en-US" dirty="0">
-                <a:ea typeface="맑은 고딕" panose="020B0503020000020004" pitchFamily="50" charset="-127"/>
-              </a:rPr>
-              <a:t>팀 웹 서버에 파일을 저장합니다</a:t>
-            </a:r>
-            <a:r>
-              <a:rPr lang="en-US" altLang="ko-KR" dirty="0">
-                <a:ea typeface="맑은 고딕" panose="020B0503020000020004" pitchFamily="50" charset="-127"/>
-              </a:rPr>
-              <a:t>.</a:t>
-            </a:r>
-          </a:p>
-          <a:p>
-            <a:pPr marL="171450" indent="-171450" rtl="0">
-              <a:buFont typeface="Arial" panose="020B0604020202020204" pitchFamily="34" charset="0"/>
-              <a:buChar char="•"/>
-            </a:pPr>
-            <a:r>
-              <a:rPr lang="ko-KR" altLang="en-US" dirty="0">
-                <a:ea typeface="맑은 고딕" panose="020B0503020000020004" pitchFamily="50" charset="-127"/>
-              </a:rPr>
-              <a:t>팀 웹 서버의 다른 위치로 파일을 이동합니다</a:t>
-            </a:r>
-            <a:r>
-              <a:rPr lang="en-US" altLang="ko-KR" dirty="0">
-                <a:ea typeface="맑은 고딕" panose="020B0503020000020004" pitchFamily="50" charset="-127"/>
-              </a:rPr>
-              <a:t>.</a:t>
-            </a:r>
-          </a:p>
-          <a:p>
-            <a:pPr marL="171450" indent="-171450" rtl="0">
-              <a:buFont typeface="Arial" panose="020B0604020202020204" pitchFamily="34" charset="0"/>
-              <a:buChar char="•"/>
-            </a:pPr>
-            <a:r>
-              <a:rPr lang="ko-KR" altLang="en-US" dirty="0">
-                <a:ea typeface="맑은 고딕" panose="020B0503020000020004" pitchFamily="50" charset="-127"/>
-              </a:rPr>
-              <a:t>팀 웹 서버의 파일을 공유합니다</a:t>
-            </a:r>
-            <a:r>
-              <a:rPr lang="en-US" altLang="ko-KR" dirty="0">
-                <a:ea typeface="맑은 고딕" panose="020B0503020000020004" pitchFamily="50" charset="-127"/>
-              </a:rPr>
-              <a:t>.</a:t>
-            </a:r>
-          </a:p>
-          <a:p>
-            <a:pPr rtl="0"/>
-            <a:endParaRPr lang="ko-KR" altLang="en-US" noProof="0" dirty="0"/>
-          </a:p>
-          <a:p>
-            <a:pPr rtl="0"/>
-            <a:endParaRPr lang="ko-KR" altLang="en-US" noProof="0" dirty="0"/>
+          <a:bodyPr/>
+          <a:lstStyle/>
+          <a:p>
+            <a:endParaRPr lang="ko-KR" altLang="en-US"/>
           </a:p>
         </p:txBody>
       </p:sp>
@@ -2225,22 +2055,22 @@
         </p:nvSpPr>
         <p:spPr/>
         <p:txBody>
-          <a:bodyPr rtlCol="0"/>
-          <a:lstStyle/>
-          <a:p>
-            <a:pPr rtl="0"/>
-            <a:fld id="{CF2FD335-6D8E-486A-8F5F-DFC7325903FF}" type="slidenum">
-              <a:rPr lang="en-US" smtClean="0"/>
+          <a:bodyPr/>
+          <a:lstStyle/>
+          <a:p>
+            <a:pPr rtl="0"/>
+            <a:fld id="{32674CE4-FBD8-4481-AEFB-CA53E599A745}" type="slidenum">
+              <a:rPr lang="en-US" altLang="ko-KR" smtClean="0"/>
               <a:t>5</a:t>
             </a:fld>
-            <a:endParaRPr lang="en-US" dirty="0"/>
+            <a:endParaRPr lang="ko-KR" altLang="en-US" dirty="0"/>
           </a:p>
         </p:txBody>
       </p:sp>
     </p:spTree>
     <p:extLst>
       <p:ext uri="{BB962C8B-B14F-4D97-AF65-F5344CB8AC3E}">
-        <p14:creationId xmlns:p14="http://schemas.microsoft.com/office/powerpoint/2010/main" val="3522640352"/>
+        <p14:creationId xmlns:p14="http://schemas.microsoft.com/office/powerpoint/2010/main" val="3816883515"/>
       </p:ext>
     </p:extLst>
   </p:cSld>
@@ -2325,7 +2155,7 @@
     </p:spTree>
     <p:extLst>
       <p:ext uri="{BB962C8B-B14F-4D97-AF65-F5344CB8AC3E}">
-        <p14:creationId xmlns:p14="http://schemas.microsoft.com/office/powerpoint/2010/main" val="3816883515"/>
+        <p14:creationId xmlns:p14="http://schemas.microsoft.com/office/powerpoint/2010/main" val="3568030504"/>
       </p:ext>
     </p:extLst>
   </p:cSld>
@@ -2410,7 +2240,7 @@
     </p:spTree>
     <p:extLst>
       <p:ext uri="{BB962C8B-B14F-4D97-AF65-F5344CB8AC3E}">
-        <p14:creationId xmlns:p14="http://schemas.microsoft.com/office/powerpoint/2010/main" val="3568030504"/>
+        <p14:creationId xmlns:p14="http://schemas.microsoft.com/office/powerpoint/2010/main" val="3773688302"/>
       </p:ext>
     </p:extLst>
   </p:cSld>
@@ -2495,7 +2325,7 @@
     </p:spTree>
     <p:extLst>
       <p:ext uri="{BB962C8B-B14F-4D97-AF65-F5344CB8AC3E}">
-        <p14:creationId xmlns:p14="http://schemas.microsoft.com/office/powerpoint/2010/main" val="3773688302"/>
+        <p14:creationId xmlns:p14="http://schemas.microsoft.com/office/powerpoint/2010/main" val="1498799750"/>
       </p:ext>
     </p:extLst>
   </p:cSld>
@@ -2580,7 +2410,7 @@
     </p:spTree>
     <p:extLst>
       <p:ext uri="{BB962C8B-B14F-4D97-AF65-F5344CB8AC3E}">
-        <p14:creationId xmlns:p14="http://schemas.microsoft.com/office/powerpoint/2010/main" val="1498799750"/>
+        <p14:creationId xmlns:p14="http://schemas.microsoft.com/office/powerpoint/2010/main" val="1898085462"/>
       </p:ext>
     </p:extLst>
   </p:cSld>
@@ -3321,7 +3151,7 @@
             <a:fld id="{94694F25-D644-42F1-B3CC-9F453010BC16}" type="datetime4">
               <a:rPr lang="ko-KR" altLang="en-US" smtClean="0"/>
               <a:pPr/>
-              <a:t>2021년 1월 26일</a:t>
+              <a:t>2021년 1월 27일</a:t>
             </a:fld>
             <a:endParaRPr lang="ko-KR" altLang="en-US" dirty="0"/>
           </a:p>
@@ -3534,7 +3364,7 @@
             <a:fld id="{DFB6B5C9-4B18-4F34-8E3E-FAD2AE1D9784}" type="datetime4">
               <a:rPr lang="ko-KR" altLang="en-US" smtClean="0"/>
               <a:pPr/>
-              <a:t>2021년 1월 26일</a:t>
+              <a:t>2021년 1월 27일</a:t>
             </a:fld>
             <a:endParaRPr lang="ko-KR" altLang="en-US" dirty="0"/>
           </a:p>
@@ -3748,7 +3578,7 @@
             <a:fld id="{533A0385-CE73-423F-9B05-AF254D6215F2}" type="datetime4">
               <a:rPr lang="ko-KR" altLang="en-US" smtClean="0"/>
               <a:pPr/>
-              <a:t>2021년 1월 26일</a:t>
+              <a:t>2021년 1월 27일</a:t>
             </a:fld>
             <a:endParaRPr lang="ko-KR" altLang="en-US" dirty="0"/>
           </a:p>
@@ -3951,7 +3781,7 @@
             <a:fld id="{7F488AF3-E4C2-46C4-883C-60860EA77C5C}" type="datetime4">
               <a:rPr lang="ko-KR" altLang="en-US" smtClean="0"/>
               <a:pPr/>
-              <a:t>2021년 1월 26일</a:t>
+              <a:t>2021년 1월 27일</a:t>
             </a:fld>
             <a:endParaRPr lang="ko-KR" altLang="en-US" dirty="0"/>
           </a:p>
@@ -4194,7 +4024,7 @@
             <a:fld id="{82B6626D-13F9-4303-ACEA-CC76B0514040}" type="datetime4">
               <a:rPr lang="ko-KR" altLang="en-US" smtClean="0"/>
               <a:pPr/>
-              <a:t>2021년 1월 26일</a:t>
+              <a:t>2021년 1월 27일</a:t>
             </a:fld>
             <a:endParaRPr lang="ko-KR" altLang="en-US" dirty="0"/>
           </a:p>
@@ -4481,7 +4311,7 @@
             <a:fld id="{30EDF400-A36F-4704-AF2F-BBAC0CF33C56}" type="datetime4">
               <a:rPr lang="ko-KR" altLang="en-US" smtClean="0"/>
               <a:pPr/>
-              <a:t>2021년 1월 26일</a:t>
+              <a:t>2021년 1월 27일</a:t>
             </a:fld>
             <a:endParaRPr lang="ko-KR" altLang="en-US" dirty="0"/>
           </a:p>
@@ -4931,7 +4761,7 @@
             <a:fld id="{BE1F0414-1742-40E5-BCBF-A637EDE2C2BF}" type="datetime4">
               <a:rPr lang="ko-KR" altLang="en-US" smtClean="0"/>
               <a:pPr/>
-              <a:t>2021년 1월 26일</a:t>
+              <a:t>2021년 1월 27일</a:t>
             </a:fld>
             <a:endParaRPr lang="ko-KR" altLang="en-US" dirty="0"/>
           </a:p>
@@ -5095,7 +4925,7 @@
             <a:fld id="{12D8F88E-7F41-4146-ADAC-5DDED3CCCDF5}" type="datetime4">
               <a:rPr lang="ko-KR" altLang="en-US" smtClean="0"/>
               <a:pPr/>
-              <a:t>2021년 1월 26일</a:t>
+              <a:t>2021년 1월 27일</a:t>
             </a:fld>
             <a:endParaRPr lang="ko-KR" altLang="en-US" dirty="0"/>
           </a:p>
@@ -5217,7 +5047,7 @@
             <a:fld id="{6544992A-6B43-4D9C-91BA-45B4770FA9EC}" type="datetime4">
               <a:rPr lang="ko-KR" altLang="en-US" smtClean="0"/>
               <a:pPr/>
-              <a:t>2021년 1월 26일</a:t>
+              <a:t>2021년 1월 27일</a:t>
             </a:fld>
             <a:endParaRPr lang="ko-KR" altLang="en-US" dirty="0"/>
           </a:p>
@@ -5489,7 +5319,7 @@
             <a:fld id="{97EB5C94-FDA9-4D16-B72E-6A88FE13E8C6}" type="datetime4">
               <a:rPr lang="ko-KR" altLang="en-US" smtClean="0"/>
               <a:pPr/>
-              <a:t>2021년 1월 26일</a:t>
+              <a:t>2021년 1월 27일</a:t>
             </a:fld>
             <a:endParaRPr lang="ko-KR" altLang="en-US" dirty="0"/>
           </a:p>
@@ -5762,7 +5592,7 @@
             <a:fld id="{726E5215-DDDB-4AE1-BB3B-7D32E26C92B4}" type="datetime4">
               <a:rPr lang="ko-KR" altLang="en-US" smtClean="0"/>
               <a:pPr/>
-              <a:t>2021년 1월 26일</a:t>
+              <a:t>2021년 1월 27일</a:t>
             </a:fld>
             <a:endParaRPr lang="ko-KR" altLang="en-US" dirty="0"/>
           </a:p>
@@ -6655,7 +6485,7 @@
             <a:fld id="{65FF3804-A92E-4DFF-A0B3-62A49209ED6C}" type="datetime4">
               <a:rPr lang="ko-KR" altLang="en-US" smtClean="0"/>
               <a:pPr/>
-              <a:t>2021년 1월 26일</a:t>
+              <a:t>2021년 1월 27일</a:t>
             </a:fld>
             <a:endParaRPr lang="ko-KR" altLang="en-US" dirty="0"/>
           </a:p>
@@ -7087,15 +6917,7 @@
             <a:pPr rtl="0"/>
             <a:r>
               <a:rPr lang="en-US" altLang="ko-KR" dirty="0" smtClean="0"/>
-              <a:t>Regularization, </a:t>
-            </a:r>
-            <a:r>
-              <a:rPr lang="en-US" altLang="ko-KR" dirty="0" err="1" smtClean="0"/>
-              <a:t>Hyperparameters</a:t>
-            </a:r>
-            <a:r>
-              <a:rPr lang="en-US" altLang="ko-KR" dirty="0" smtClean="0"/>
-              <a:t>, </a:t>
+              <a:t>Regularization, Hyper parameters, </a:t>
             </a:r>
             <a:br>
               <a:rPr lang="en-US" altLang="ko-KR" dirty="0" smtClean="0"/>
@@ -7199,7 +7021,12 @@
             <p:ph type="title"/>
           </p:nvPr>
         </p:nvSpPr>
-        <p:spPr/>
+        <p:spPr>
+          <a:xfrm>
+            <a:off x="554736" y="795528"/>
+            <a:ext cx="10972800" cy="1066800"/>
+          </a:xfrm>
+        </p:spPr>
         <p:txBody>
           <a:bodyPr rtlCol="0"/>
           <a:lstStyle/>
@@ -7213,9 +7040,33 @@
           </a:p>
         </p:txBody>
       </p:sp>
-      <p:sp>
-        <p:nvSpPr>
-          <p:cNvPr id="6" name="텍스트 개체 틀 5"/>
+      <p:pic>
+        <p:nvPicPr>
+          <p:cNvPr id="5" name="그림 4"/>
+          <p:cNvPicPr>
+            <a:picLocks noChangeAspect="1"/>
+          </p:cNvPicPr>
+          <p:nvPr/>
+        </p:nvPicPr>
+        <p:blipFill>
+          <a:blip r:embed="rId3"/>
+          <a:stretch>
+            <a:fillRect/>
+          </a:stretch>
+        </p:blipFill>
+        <p:spPr>
+          <a:xfrm>
+            <a:off x="394050" y="1818548"/>
+            <a:ext cx="9600342" cy="4569499"/>
+          </a:xfrm>
+          <a:prstGeom prst="rect">
+            <a:avLst/>
+          </a:prstGeom>
+        </p:spPr>
+      </p:pic>
+      <p:sp>
+        <p:nvSpPr>
+          <p:cNvPr id="10" name="텍스트 개체 틀 5"/>
           <p:cNvSpPr>
             <a:spLocks noGrp="1"/>
           </p:cNvSpPr>
@@ -7223,85 +7074,98 @@
             <p:ph sz="half" idx="1"/>
           </p:nvPr>
         </p:nvSpPr>
-        <p:spPr/>
-        <p:txBody>
-          <a:bodyPr rtlCol="0"/>
-          <a:lstStyle/>
-          <a:p>
-            <a:pPr rtl="0"/>
-            <a:r>
-              <a:rPr lang="ko-KR" altLang="en-US" dirty="0"/>
-              <a:t>여기에 텍스트를 추가합니다</a:t>
-            </a:r>
-            <a:r>
-              <a:rPr lang="en-US" altLang="ko-KR" dirty="0"/>
-              <a:t>. </a:t>
-            </a:r>
-          </a:p>
-          <a:p>
-            <a:pPr rtl="0"/>
-            <a:r>
-              <a:rPr lang="ko-KR" altLang="en-US" dirty="0"/>
-              <a:t>오른쪽 열에 그림</a:t>
-            </a:r>
-            <a:r>
-              <a:rPr lang="en-US" altLang="ko-KR" dirty="0"/>
-              <a:t>, </a:t>
-            </a:r>
-            <a:r>
-              <a:rPr lang="ko-KR" altLang="en-US" dirty="0"/>
-              <a:t>차트 또는 기타 콘텐츠를 추가하려면 해당 아이콘을 클릭합니다</a:t>
-            </a:r>
-            <a:r>
-              <a:rPr lang="en-US" altLang="ko-KR" dirty="0"/>
-              <a:t>.</a:t>
-            </a:r>
-          </a:p>
-          <a:p>
-            <a:pPr rtl="0"/>
-            <a:r>
-              <a:rPr lang="ko-KR" altLang="en-US" dirty="0"/>
-              <a:t>슬라이드를 추가하려면 삽입 메뉴의 새 슬라이드를 클릭하거나 </a:t>
-            </a:r>
-            <a:r>
-              <a:rPr lang="en-US" altLang="ko-KR" dirty="0"/>
-              <a:t>CTRL+M</a:t>
-            </a:r>
-            <a:r>
-              <a:rPr lang="ko-KR" altLang="en-US" dirty="0"/>
-              <a:t>을 누릅니다</a:t>
-            </a:r>
-            <a:r>
-              <a:rPr lang="en-US" altLang="ko-KR" dirty="0"/>
-              <a:t>.</a:t>
-            </a:r>
-          </a:p>
-        </p:txBody>
-      </p:sp>
-      <p:sp>
-        <p:nvSpPr>
-          <p:cNvPr id="3" name="내용 개체 틀 2"/>
-          <p:cNvSpPr>
-            <a:spLocks noGrp="1"/>
-          </p:cNvSpPr>
-          <p:nvPr>
-            <p:ph sz="half" idx="2"/>
-          </p:nvPr>
-        </p:nvSpPr>
-        <p:spPr/>
-        <p:txBody>
-          <a:bodyPr rtlCol="0"/>
-          <a:lstStyle/>
-          <a:p>
-            <a:pPr rtl="0"/>
-            <a:endParaRPr lang="ko-KR" altLang="en-US" dirty="0"/>
+        <p:spPr>
+          <a:xfrm>
+            <a:off x="5830824" y="3124056"/>
+            <a:ext cx="5384800" cy="4341875"/>
+          </a:xfrm>
+        </p:spPr>
+        <p:txBody>
+          <a:bodyPr rtlCol="0">
+            <a:normAutofit/>
+          </a:bodyPr>
+          <a:lstStyle/>
+          <a:p>
+            <a:pPr rtl="0"/>
+            <a:r>
+              <a:rPr lang="ko-KR" altLang="en-US" sz="2200" dirty="0" smtClean="0"/>
+              <a:t>곡선의 굴곡 </a:t>
+            </a:r>
+            <a:r>
+              <a:rPr lang="en-US" altLang="ko-KR" sz="2200" dirty="0" smtClean="0"/>
+              <a:t>: </a:t>
+            </a:r>
+            <a:r>
+              <a:rPr lang="ko-KR" altLang="en-US" sz="2200" dirty="0" smtClean="0"/>
+              <a:t>완만함</a:t>
+            </a:r>
+            <a:endParaRPr lang="en-US" altLang="ko-KR" sz="2200" dirty="0" smtClean="0"/>
+          </a:p>
+          <a:p>
+            <a:pPr rtl="0"/>
+            <a:r>
+              <a:rPr lang="ko-KR" altLang="en-US" sz="2200" dirty="0" smtClean="0"/>
+              <a:t>극점에서의 곡률</a:t>
+            </a:r>
+            <a:r>
+              <a:rPr lang="en-US" altLang="ko-KR" sz="2200" dirty="0" smtClean="0"/>
+              <a:t>(curvature)</a:t>
+            </a:r>
+            <a:r>
+              <a:rPr lang="ko-KR" altLang="en-US" sz="2200" dirty="0" smtClean="0"/>
+              <a:t> </a:t>
+            </a:r>
+            <a:r>
+              <a:rPr lang="en-US" altLang="ko-KR" sz="2200" dirty="0" smtClean="0"/>
+              <a:t>: </a:t>
+            </a:r>
+            <a:r>
+              <a:rPr lang="ko-KR" altLang="en-US" sz="2200" dirty="0" smtClean="0"/>
+              <a:t>작음</a:t>
+            </a:r>
+            <a:endParaRPr lang="en-US" altLang="ko-KR" sz="2200" dirty="0" smtClean="0"/>
+          </a:p>
+          <a:p>
+            <a:pPr rtl="0"/>
+            <a:r>
+              <a:rPr lang="ko-KR" altLang="en-US" sz="2200" dirty="0" smtClean="0"/>
+              <a:t>방정식의 계수 값 </a:t>
+            </a:r>
+            <a:r>
+              <a:rPr lang="en-US" altLang="ko-KR" sz="2200" dirty="0" smtClean="0"/>
+              <a:t>: </a:t>
+            </a:r>
+            <a:r>
+              <a:rPr lang="ko-KR" altLang="en-US" sz="2200" dirty="0" smtClean="0"/>
+              <a:t>적당함</a:t>
+            </a:r>
+            <a:endParaRPr lang="en-US" altLang="ko-KR" sz="2200" dirty="0" smtClean="0"/>
+          </a:p>
+          <a:p>
+            <a:pPr rtl="0"/>
+            <a:endParaRPr lang="en-US" altLang="ko-KR" sz="2200" dirty="0"/>
+          </a:p>
+          <a:p>
+            <a:pPr rtl="0"/>
+            <a:endParaRPr lang="en-US" altLang="ko-KR" sz="2200" dirty="0" smtClean="0"/>
+          </a:p>
+          <a:p>
+            <a:r>
+              <a:rPr lang="ko-KR" altLang="en-US" sz="2200" dirty="0"/>
+              <a:t>가중치를 작게 유지함으로써 일반화 능력을 향상시킴</a:t>
+            </a:r>
+            <a:endParaRPr lang="en-US" altLang="ko-KR" sz="2200" dirty="0"/>
+          </a:p>
+          <a:p>
+            <a:pPr rtl="0"/>
+            <a:endParaRPr lang="en-US" altLang="ko-KR" sz="2200" dirty="0"/>
           </a:p>
         </p:txBody>
       </p:sp>
     </p:spTree>
     <p:extLst>
       <p:ext uri="{BB962C8B-B14F-4D97-AF65-F5344CB8AC3E}">
-        <p14:creationId xmlns:p14="http://schemas.microsoft.com/office/powerpoint/2010/main" val="3574460062"/>
+        <p14:creationId xmlns:p14="http://schemas.microsoft.com/office/powerpoint/2010/main" val="1771071978"/>
       </p:ext>
     </p:extLst>
   </p:cSld>
@@ -7364,32 +7228,117 @@
           <a:p>
             <a:pPr rtl="0"/>
             <a:r>
-              <a:rPr lang="en-US" altLang="ko-KR" dirty="0"/>
-              <a:t>1</a:t>
-            </a:r>
-            <a:r>
-              <a:rPr lang="ko-KR" altLang="en-US" dirty="0"/>
-              <a:t>단원</a:t>
-            </a:r>
-            <a:r>
-              <a:rPr lang="en-US" altLang="ko-KR" dirty="0"/>
+              <a:rPr lang="en-US" altLang="ko-KR" dirty="0" smtClean="0"/>
+              <a:t>Parameter                  Hyper parameter</a:t>
+            </a:r>
+            <a:endParaRPr lang="ko-KR" altLang="en-US" dirty="0"/>
+          </a:p>
+        </p:txBody>
+      </p:sp>
+      <p:sp>
+        <p:nvSpPr>
+          <p:cNvPr id="4" name="텍스트 개체 틀 3"/>
+          <p:cNvSpPr>
+            <a:spLocks noGrp="1"/>
+          </p:cNvSpPr>
+          <p:nvPr>
+            <p:ph sz="half" idx="1"/>
+          </p:nvPr>
+        </p:nvSpPr>
+        <p:spPr/>
+        <p:txBody>
+          <a:bodyPr rtlCol="0"/>
+          <a:lstStyle/>
+          <a:p>
+            <a:pPr marL="109728" indent="0" rtl="0">
+              <a:buNone/>
+            </a:pPr>
+            <a:endParaRPr lang="en-US" altLang="ko-KR" dirty="0" smtClean="0"/>
+          </a:p>
+          <a:p>
+            <a:pPr marL="109728" indent="0" rtl="0">
+              <a:buNone/>
+            </a:pPr>
+            <a:endParaRPr lang="en-US" altLang="ko-KR" dirty="0"/>
+          </a:p>
+          <a:p>
+            <a:pPr rtl="0"/>
+            <a:r>
+              <a:rPr lang="ko-KR" altLang="en-US" dirty="0" smtClean="0"/>
+              <a:t>모델 내부에서 결정되는 변수</a:t>
+            </a:r>
+            <a:endParaRPr lang="en-US" altLang="ko-KR" dirty="0" smtClean="0"/>
+          </a:p>
+          <a:p>
+            <a:pPr rtl="0"/>
+            <a:r>
+              <a:rPr lang="ko-KR" altLang="en-US" dirty="0" smtClean="0"/>
+              <a:t>데이터로부터 결정됨</a:t>
+            </a:r>
+            <a:endParaRPr lang="en-US" altLang="ko-KR" dirty="0" smtClean="0"/>
+          </a:p>
+          <a:p>
+            <a:pPr rtl="0"/>
+            <a:endParaRPr lang="en-US" altLang="ko-KR" dirty="0"/>
+          </a:p>
+          <a:p>
+            <a:pPr rtl="0"/>
+            <a:r>
+              <a:rPr lang="ko-KR" altLang="en-US" dirty="0" smtClean="0"/>
+              <a:t>목적 </a:t>
+            </a:r>
+            <a:r>
+              <a:rPr lang="en-US" altLang="ko-KR" dirty="0" smtClean="0"/>
               <a:t>: </a:t>
             </a:r>
             <a:r>
-              <a:rPr lang="ko-KR" altLang="en-US" dirty="0"/>
-              <a:t>마무리</a:t>
-            </a:r>
-          </a:p>
-        </p:txBody>
-      </p:sp>
-      <p:sp>
-        <p:nvSpPr>
-          <p:cNvPr id="3" name="내용 개체 틀 2"/>
-          <p:cNvSpPr>
-            <a:spLocks noGrp="1"/>
-          </p:cNvSpPr>
-          <p:nvPr>
-            <p:ph idx="1"/>
+              <a:rPr lang="ko-KR" altLang="en-US" dirty="0" smtClean="0"/>
+              <a:t>최적화된 머신 러닝 모델 구현</a:t>
+            </a:r>
+            <a:endParaRPr lang="en-US" altLang="ko-KR" dirty="0" smtClean="0"/>
+          </a:p>
+          <a:p>
+            <a:pPr rtl="0"/>
+            <a:endParaRPr lang="en-US" altLang="ko-KR" dirty="0"/>
+          </a:p>
+          <a:p>
+            <a:pPr rtl="0"/>
+            <a:r>
+              <a:rPr lang="ko-KR" altLang="en-US" dirty="0" smtClean="0"/>
+              <a:t>예</a:t>
+            </a:r>
+            <a:r>
+              <a:rPr lang="en-US" altLang="ko-KR" dirty="0" smtClean="0"/>
+              <a:t>) </a:t>
+            </a:r>
+            <a:r>
+              <a:rPr lang="ko-KR" altLang="en-US" dirty="0" smtClean="0"/>
+              <a:t>인공신경망의 가중치</a:t>
+            </a:r>
+            <a:r>
+              <a:rPr lang="en-US" altLang="ko-KR" dirty="0" smtClean="0"/>
+              <a:t>, </a:t>
+            </a:r>
+            <a:r>
+              <a:rPr lang="ko-KR" altLang="en-US" dirty="0" smtClean="0"/>
+              <a:t>선형회귀에서의 </a:t>
+            </a:r>
+            <a:r>
+              <a:rPr lang="ko-KR" altLang="en-US" dirty="0" err="1" smtClean="0"/>
+              <a:t>결정계수</a:t>
+            </a:r>
+            <a:endParaRPr lang="ko-KR" altLang="en-US" dirty="0"/>
+          </a:p>
+        </p:txBody>
+      </p:sp>
+      <p:sp>
+        <p:nvSpPr>
+          <p:cNvPr id="5" name="내용 개체 틀 4"/>
+          <p:cNvSpPr>
+            <a:spLocks noGrp="1"/>
+          </p:cNvSpPr>
+          <p:nvPr>
+            <p:ph sz="half" idx="2"/>
           </p:nvPr>
         </p:nvSpPr>
         <p:spPr/>
@@ -7397,33 +7346,110 @@
           <a:bodyPr rtlCol="0"/>
           <a:lstStyle/>
           <a:p>
-            <a:pPr rtl="0"/>
-            <a:r>
-              <a:rPr lang="ko-KR" altLang="en-US" dirty="0"/>
-              <a:t>요점을 요약합니다</a:t>
-            </a:r>
-            <a:r>
-              <a:rPr lang="en-US" altLang="ko-KR" dirty="0"/>
-              <a:t>.</a:t>
-            </a:r>
-          </a:p>
-          <a:p>
-            <a:pPr rtl="0"/>
-            <a:r>
-              <a:rPr lang="ko-KR" altLang="en-US" dirty="0"/>
-              <a:t>질문 시간을 제공합니다</a:t>
-            </a:r>
-            <a:r>
-              <a:rPr lang="en-US" altLang="ko-KR" dirty="0"/>
-              <a:t>.</a:t>
-            </a:r>
+            <a:pPr marL="109728" indent="0" rtl="0">
+              <a:buNone/>
+            </a:pPr>
+            <a:endParaRPr lang="en-US" altLang="ko-KR" dirty="0" smtClean="0"/>
+          </a:p>
+          <a:p>
+            <a:pPr marL="109728" indent="0" rtl="0">
+              <a:buNone/>
+            </a:pPr>
+            <a:endParaRPr lang="en-US" altLang="ko-KR" dirty="0" smtClean="0"/>
+          </a:p>
+          <a:p>
+            <a:pPr rtl="0"/>
+            <a:r>
+              <a:rPr lang="ko-KR" altLang="en-US" dirty="0" smtClean="0"/>
+              <a:t>모델 외부에서 결정되는 변수                </a:t>
+            </a:r>
+            <a:r>
+              <a:rPr lang="en-US" altLang="ko-KR" dirty="0" smtClean="0"/>
+              <a:t>(</a:t>
+            </a:r>
+            <a:r>
+              <a:rPr lang="ko-KR" altLang="en-US" dirty="0" smtClean="0"/>
+              <a:t>사용자가 직접 세팅해주는 값</a:t>
+            </a:r>
+            <a:r>
+              <a:rPr lang="en-US" altLang="ko-KR" dirty="0" smtClean="0"/>
+              <a:t>)</a:t>
+            </a:r>
+          </a:p>
+          <a:p>
+            <a:pPr rtl="0"/>
+            <a:endParaRPr lang="en-US" altLang="ko-KR" dirty="0"/>
+          </a:p>
+          <a:p>
+            <a:pPr rtl="0"/>
+            <a:r>
+              <a:rPr lang="ko-KR" altLang="en-US" dirty="0" smtClean="0"/>
+              <a:t>목적 </a:t>
+            </a:r>
+            <a:r>
+              <a:rPr lang="en-US" altLang="ko-KR" dirty="0" smtClean="0"/>
+              <a:t>: </a:t>
+            </a:r>
+            <a:r>
+              <a:rPr lang="ko-KR" altLang="en-US" dirty="0" smtClean="0"/>
+              <a:t>모델링 최적화 </a:t>
+            </a:r>
+            <a:r>
+              <a:rPr lang="ko-KR" altLang="en-US" dirty="0" err="1" smtClean="0"/>
+              <a:t>파라미터</a:t>
+            </a:r>
+            <a:r>
+              <a:rPr lang="ko-KR" altLang="en-US" dirty="0" smtClean="0"/>
+              <a:t> 값 도출</a:t>
+            </a:r>
+            <a:endParaRPr lang="en-US" altLang="ko-KR" dirty="0" smtClean="0"/>
+          </a:p>
+          <a:p>
+            <a:pPr rtl="0"/>
+            <a:endParaRPr lang="en-US" altLang="ko-KR" dirty="0"/>
+          </a:p>
+          <a:p>
+            <a:pPr rtl="0"/>
+            <a:r>
+              <a:rPr lang="ko-KR" altLang="en-US" dirty="0" smtClean="0"/>
+              <a:t>예</a:t>
+            </a:r>
+            <a:r>
+              <a:rPr lang="en-US" altLang="ko-KR" dirty="0" smtClean="0"/>
+              <a:t>) </a:t>
+            </a:r>
+            <a:r>
+              <a:rPr lang="ko-KR" altLang="en-US" dirty="0" err="1" smtClean="0"/>
+              <a:t>학습률</a:t>
+            </a:r>
+            <a:r>
+              <a:rPr lang="en-US" altLang="ko-KR" dirty="0" smtClean="0"/>
+              <a:t>, </a:t>
+            </a:r>
+            <a:r>
+              <a:rPr lang="ko-KR" altLang="en-US" dirty="0" err="1" smtClean="0"/>
+              <a:t>경사하강법</a:t>
+            </a:r>
+            <a:r>
+              <a:rPr lang="ko-KR" altLang="en-US" dirty="0" smtClean="0"/>
+              <a:t> 반복 횟수</a:t>
+            </a:r>
+            <a:r>
+              <a:rPr lang="en-US" altLang="ko-KR" dirty="0" smtClean="0"/>
+              <a:t>, </a:t>
+            </a:r>
+            <a:r>
+              <a:rPr lang="ko-KR" altLang="en-US" dirty="0" smtClean="0"/>
+              <a:t>활성화 함수</a:t>
+            </a:r>
+            <a:endParaRPr lang="ko-KR" altLang="en-US" dirty="0"/>
           </a:p>
         </p:txBody>
       </p:sp>
     </p:spTree>
     <p:extLst>
       <p:ext uri="{BB962C8B-B14F-4D97-AF65-F5344CB8AC3E}">
-        <p14:creationId xmlns:p14="http://schemas.microsoft.com/office/powerpoint/2010/main" val="3514341159"/>
+        <p14:creationId xmlns:p14="http://schemas.microsoft.com/office/powerpoint/2010/main" val="411993636"/>
       </p:ext>
     </p:extLst>
   </p:cSld>
@@ -7486,78 +7512,39 @@
           <a:p>
             <a:pPr rtl="0"/>
             <a:r>
-              <a:rPr lang="en-US" altLang="ko-KR" dirty="0"/>
-              <a:t>2</a:t>
-            </a:r>
-            <a:r>
-              <a:rPr lang="ko-KR" altLang="en-US" dirty="0"/>
-              <a:t>단원</a:t>
-            </a:r>
-            <a:r>
-              <a:rPr lang="en-US" altLang="ko-KR" dirty="0"/>
-              <a:t>: </a:t>
-            </a:r>
-            <a:r>
-              <a:rPr lang="ko-KR" altLang="en-US" dirty="0"/>
-              <a:t>목표</a:t>
-            </a:r>
-          </a:p>
-        </p:txBody>
-      </p:sp>
-      <p:sp>
-        <p:nvSpPr>
-          <p:cNvPr id="3" name="내용 개체 틀 2"/>
-          <p:cNvSpPr>
-            <a:spLocks noGrp="1"/>
-          </p:cNvSpPr>
+              <a:rPr lang="en-US" altLang="ko-KR" dirty="0" smtClean="0"/>
+              <a:t>Hyper parameter</a:t>
+            </a:r>
+            <a:endParaRPr lang="ko-KR" altLang="en-US" dirty="0"/>
+          </a:p>
+        </p:txBody>
+      </p:sp>
+      <p:pic>
+        <p:nvPicPr>
+          <p:cNvPr id="4" name="내용 개체 틀 3"/>
+          <p:cNvPicPr>
+            <a:picLocks noGrp="1" noChangeAspect="1"/>
+          </p:cNvPicPr>
           <p:nvPr>
             <p:ph idx="1"/>
           </p:nvPr>
-        </p:nvSpPr>
-        <p:spPr/>
-        <p:txBody>
-          <a:bodyPr rtlCol="0"/>
-          <a:lstStyle/>
-          <a:p>
-            <a:pPr rtl="0"/>
-            <a:r>
-              <a:rPr lang="ko-KR" altLang="en-US" dirty="0"/>
-              <a:t>이 교육 세션에서 의도하는 결과를 나열합니다</a:t>
-            </a:r>
-            <a:r>
-              <a:rPr lang="en-US" altLang="ko-KR" dirty="0"/>
-              <a:t>.</a:t>
-            </a:r>
-          </a:p>
-          <a:p>
-            <a:pPr rtl="0"/>
-            <a:r>
-              <a:rPr lang="ko-KR" altLang="en-US" dirty="0"/>
-              <a:t>각 목표는 간결해야 하며</a:t>
-            </a:r>
-            <a:r>
-              <a:rPr lang="en-US" altLang="ko-KR" dirty="0"/>
-              <a:t>, </a:t>
-            </a:r>
-            <a:r>
-              <a:rPr lang="ko-KR" altLang="en-US" dirty="0"/>
-              <a:t>동사를 포함해야 하고</a:t>
-            </a:r>
-            <a:r>
-              <a:rPr lang="en-US" altLang="ko-KR" dirty="0"/>
-              <a:t>, </a:t>
-            </a:r>
-            <a:r>
-              <a:rPr lang="ko-KR" altLang="en-US" dirty="0"/>
-              <a:t>측정할 수 있는 결과가 있어야 합니다</a:t>
-            </a:r>
-            <a:r>
-              <a:rPr lang="en-US" altLang="ko-KR" dirty="0"/>
-              <a:t>.</a:t>
-            </a:r>
-          </a:p>
-        </p:txBody>
-      </p:sp>
+        </p:nvPicPr>
+        <p:blipFill>
+          <a:blip r:embed="rId3"/>
+          <a:stretch>
+            <a:fillRect/>
+          </a:stretch>
+        </p:blipFill>
+        <p:spPr>
+          <a:xfrm>
+            <a:off x="1519237" y="2278063"/>
+            <a:ext cx="9153525" cy="4267200"/>
+          </a:xfrm>
+          <a:prstGeom prst="rect">
+            <a:avLst/>
+          </a:prstGeom>
+        </p:spPr>
+      </p:pic>
     </p:spTree>
     <p:extLst>
       <p:ext uri="{BB962C8B-B14F-4D97-AF65-F5344CB8AC3E}">
@@ -7624,117 +7611,43 @@
           <a:p>
             <a:pPr rtl="0"/>
             <a:r>
-              <a:rPr lang="en-US" altLang="ko-KR" dirty="0"/>
-              <a:t>2</a:t>
-            </a:r>
-            <a:r>
-              <a:rPr lang="ko-KR" altLang="en-US" dirty="0"/>
-              <a:t>단원</a:t>
-            </a:r>
-            <a:r>
-              <a:rPr lang="en-US" altLang="ko-KR" dirty="0"/>
-              <a:t>: </a:t>
-            </a:r>
-            <a:r>
-              <a:rPr lang="ko-KR" altLang="en-US" dirty="0"/>
-              <a:t>콘텐츠</a:t>
-            </a:r>
-          </a:p>
-        </p:txBody>
-      </p:sp>
-      <p:sp>
-        <p:nvSpPr>
-          <p:cNvPr id="4" name="텍스트 개체 틀 3"/>
-          <p:cNvSpPr>
-            <a:spLocks noGrp="1"/>
-          </p:cNvSpPr>
-          <p:nvPr>
-            <p:ph sz="half" idx="1"/>
-          </p:nvPr>
-        </p:nvSpPr>
-        <p:spPr/>
-        <p:txBody>
-          <a:bodyPr rtlCol="0"/>
-          <a:lstStyle/>
-          <a:p>
-            <a:pPr rtl="0"/>
-            <a:r>
-              <a:rPr lang="ko-KR" altLang="en-US" dirty="0"/>
-              <a:t>여기에 텍스트를 추가합니다</a:t>
-            </a:r>
-            <a:r>
-              <a:rPr lang="en-US" altLang="ko-KR" dirty="0"/>
-              <a:t>. </a:t>
-            </a:r>
-          </a:p>
-          <a:p>
-            <a:pPr rtl="0"/>
-            <a:r>
-              <a:rPr lang="ko-KR" altLang="en-US" dirty="0"/>
-              <a:t>오른쪽 열에 그림</a:t>
-            </a:r>
-            <a:r>
-              <a:rPr lang="en-US" altLang="ko-KR" dirty="0"/>
-              <a:t>, </a:t>
-            </a:r>
-            <a:r>
-              <a:rPr lang="ko-KR" altLang="en-US" dirty="0"/>
-              <a:t>차트 또는 기타 콘텐츠를 추가하려면 해당 아이콘을 클릭합니다</a:t>
-            </a:r>
-            <a:r>
-              <a:rPr lang="en-US" altLang="ko-KR" dirty="0"/>
-              <a:t>.</a:t>
-            </a:r>
-          </a:p>
-          <a:p>
-            <a:pPr rtl="0"/>
-            <a:r>
-              <a:rPr lang="ko-KR" altLang="en-US" dirty="0"/>
-              <a:t>슬라이드를 추가하려면 삽입 메뉴의 새 슬라이드를 클릭하거나 </a:t>
-            </a:r>
-            <a:r>
-              <a:rPr lang="en-US" altLang="ko-KR" dirty="0"/>
-              <a:t>CTRL+M</a:t>
-            </a:r>
-            <a:r>
-              <a:rPr lang="ko-KR" altLang="en-US" dirty="0"/>
-              <a:t>을 누릅니다</a:t>
-            </a:r>
-            <a:r>
-              <a:rPr lang="en-US" altLang="ko-KR" dirty="0"/>
-              <a:t>.</a:t>
-            </a:r>
-          </a:p>
-          <a:p>
-            <a:pPr rtl="0"/>
+              <a:rPr lang="en-US" altLang="ko-KR" dirty="0" smtClean="0"/>
+              <a:t>Hyper parameter</a:t>
+            </a:r>
             <a:endParaRPr lang="ko-KR" altLang="en-US" dirty="0"/>
           </a:p>
         </p:txBody>
       </p:sp>
-      <p:sp>
-        <p:nvSpPr>
-          <p:cNvPr id="5" name="내용 개체 틀 4"/>
-          <p:cNvSpPr>
-            <a:spLocks noGrp="1"/>
-          </p:cNvSpPr>
-          <p:nvPr>
-            <p:ph sz="half" idx="2"/>
-          </p:nvPr>
-        </p:nvSpPr>
-        <p:spPr/>
-        <p:txBody>
-          <a:bodyPr rtlCol="0"/>
-          <a:lstStyle/>
-          <a:p>
-            <a:pPr rtl="0"/>
-            <a:endParaRPr lang="ko-KR" altLang="en-US" dirty="0"/>
-          </a:p>
-        </p:txBody>
-      </p:sp>
+      <p:pic>
+        <p:nvPicPr>
+          <p:cNvPr id="4" name="내용 개체 틀 3"/>
+          <p:cNvPicPr>
+            <a:picLocks noGrp="1" noChangeAspect="1"/>
+          </p:cNvPicPr>
+          <p:nvPr>
+            <p:ph idx="1"/>
+          </p:nvPr>
+        </p:nvPicPr>
+        <p:blipFill>
+          <a:blip r:embed="rId3"/>
+          <a:stretch>
+            <a:fillRect/>
+          </a:stretch>
+        </p:blipFill>
+        <p:spPr>
+          <a:xfrm>
+            <a:off x="1519237" y="2278063"/>
+            <a:ext cx="9153525" cy="4267200"/>
+          </a:xfrm>
+          <a:prstGeom prst="rect">
+            <a:avLst/>
+          </a:prstGeom>
+        </p:spPr>
+      </p:pic>
     </p:spTree>
     <p:extLst>
       <p:ext uri="{BB962C8B-B14F-4D97-AF65-F5344CB8AC3E}">
-        <p14:creationId xmlns:p14="http://schemas.microsoft.com/office/powerpoint/2010/main" val="411993636"/>
+        <p14:creationId xmlns:p14="http://schemas.microsoft.com/office/powerpoint/2010/main" val="1978932742"/>
       </p:ext>
     </p:extLst>
   </p:cSld>
@@ -7753,6 +7666,13 @@
       </p:transition>
     </mc:Fallback>
   </mc:AlternateContent>
+  <p:timing>
+    <p:tnLst>
+      <p:par>
+        <p:cTn id="1" dur="indefinite" restart="never" nodeType="tmRoot"/>
+      </p:par>
+    </p:tnLst>
+  </p:timing>
 </p:sld>
 </file>
 
@@ -7775,7 +7695,7 @@
       </p:grpSpPr>
       <p:sp>
         <p:nvSpPr>
-          <p:cNvPr id="2" name="제목 1"/>
+          <p:cNvPr id="9" name="제목 8"/>
           <p:cNvSpPr>
             <a:spLocks noGrp="1"/>
           </p:cNvSpPr>
@@ -7788,34 +7708,22 @@
           <a:bodyPr rtlCol="0"/>
           <a:lstStyle/>
           <a:p>
-            <a:pPr rtl="0"/>
             <a:r>
               <a:rPr lang="en-US" altLang="ko-KR" dirty="0"/>
-              <a:t>2</a:t>
-            </a:r>
-            <a:r>
-              <a:rPr lang="ko-KR" altLang="en-US" dirty="0"/>
-              <a:t>단원</a:t>
-            </a:r>
-            <a:r>
-              <a:rPr lang="en-US" altLang="ko-KR" dirty="0"/>
-              <a:t>: </a:t>
-            </a:r>
-            <a:r>
-              <a:rPr lang="ko-KR" altLang="en-US" dirty="0"/>
-              <a:t>마무리</a:t>
-            </a:r>
-          </a:p>
-        </p:txBody>
-      </p:sp>
-      <p:sp>
-        <p:nvSpPr>
-          <p:cNvPr id="3" name="텍스트 개체 틀 2"/>
-          <p:cNvSpPr>
-            <a:spLocks noGrp="1"/>
-          </p:cNvSpPr>
-          <p:nvPr>
-            <p:ph idx="1"/>
+              <a:t>Hyper parameter</a:t>
+            </a:r>
+            <a:endParaRPr lang="ko-KR" altLang="en-US" dirty="0"/>
+          </a:p>
+        </p:txBody>
+      </p:sp>
+      <p:sp>
+        <p:nvSpPr>
+          <p:cNvPr id="6" name="텍스트 개체 틀 5"/>
+          <p:cNvSpPr>
+            <a:spLocks noGrp="1"/>
+          </p:cNvSpPr>
+          <p:nvPr>
+            <p:ph sz="half" idx="1"/>
           </p:nvPr>
         </p:nvSpPr>
         <p:spPr/>
@@ -7823,33 +7731,71 @@
           <a:bodyPr rtlCol="0"/>
           <a:lstStyle/>
           <a:p>
-            <a:pPr rtl="0"/>
-            <a:r>
-              <a:rPr lang="ko-KR" altLang="en-US" dirty="0"/>
-              <a:t>요점을 요약합니다</a:t>
-            </a:r>
-            <a:r>
-              <a:rPr lang="en-US" altLang="ko-KR" dirty="0"/>
-              <a:t>.</a:t>
-            </a:r>
-          </a:p>
-          <a:p>
-            <a:pPr rtl="0"/>
-            <a:r>
-              <a:rPr lang="ko-KR" altLang="en-US" dirty="0"/>
-              <a:t>질문 시간을 제공합니다</a:t>
-            </a:r>
-            <a:r>
-              <a:rPr lang="en-US" altLang="ko-KR" dirty="0"/>
-              <a:t>.</a:t>
-            </a:r>
-          </a:p>
-        </p:txBody>
-      </p:sp>
+            <a:pPr marL="109728" indent="0" rtl="0">
+              <a:buNone/>
+            </a:pPr>
+            <a:endParaRPr lang="en-US" altLang="ko-KR" dirty="0"/>
+          </a:p>
+          <a:p>
+            <a:pPr rtl="0"/>
+            <a:endParaRPr lang="en-US" altLang="ko-KR" dirty="0" smtClean="0"/>
+          </a:p>
+        </p:txBody>
+      </p:sp>
+      <p:pic>
+        <p:nvPicPr>
+          <p:cNvPr id="4" name="내용 개체 틀 3"/>
+          <p:cNvPicPr>
+            <a:picLocks noGrp="1" noChangeAspect="1"/>
+          </p:cNvPicPr>
+          <p:nvPr>
+            <p:ph sz="half" idx="2"/>
+          </p:nvPr>
+        </p:nvPicPr>
+        <p:blipFill>
+          <a:blip r:embed="rId3"/>
+          <a:stretch>
+            <a:fillRect/>
+          </a:stretch>
+        </p:blipFill>
+        <p:spPr>
+          <a:xfrm>
+            <a:off x="2597804" y="1886722"/>
+            <a:ext cx="6793187" cy="1081841"/>
+          </a:xfrm>
+          <a:prstGeom prst="rect">
+            <a:avLst/>
+          </a:prstGeom>
+        </p:spPr>
+      </p:pic>
+      <p:pic>
+        <p:nvPicPr>
+          <p:cNvPr id="5" name="그림 4"/>
+          <p:cNvPicPr>
+            <a:picLocks noChangeAspect="1"/>
+          </p:cNvPicPr>
+          <p:nvPr/>
+        </p:nvPicPr>
+        <p:blipFill>
+          <a:blip r:embed="rId4"/>
+          <a:stretch>
+            <a:fillRect/>
+          </a:stretch>
+        </p:blipFill>
+        <p:spPr>
+          <a:xfrm>
+            <a:off x="2004405" y="2968563"/>
+            <a:ext cx="7979987" cy="3662362"/>
+          </a:xfrm>
+          <a:prstGeom prst="rect">
+            <a:avLst/>
+          </a:prstGeom>
+        </p:spPr>
+      </p:pic>
     </p:spTree>
     <p:extLst>
       <p:ext uri="{BB962C8B-B14F-4D97-AF65-F5344CB8AC3E}">
-        <p14:creationId xmlns:p14="http://schemas.microsoft.com/office/powerpoint/2010/main" val="2822598965"/>
+        <p14:creationId xmlns:p14="http://schemas.microsoft.com/office/powerpoint/2010/main" val="1529726441"/>
       </p:ext>
     </p:extLst>
   </p:cSld>
@@ -7868,6 +7814,13 @@
       </p:transition>
     </mc:Fallback>
   </mc:AlternateContent>
+  <p:timing>
+    <p:tnLst>
+      <p:par>
+        <p:cTn id="1" dur="indefinite" restart="never" nodeType="tmRoot"/>
+      </p:par>
+    </p:tnLst>
+  </p:timing>
 </p:sld>
 </file>
 
@@ -7890,7 +7843,7 @@
       </p:grpSpPr>
       <p:sp>
         <p:nvSpPr>
-          <p:cNvPr id="2" name="제목 1"/>
+          <p:cNvPr id="9" name="제목 8"/>
           <p:cNvSpPr>
             <a:spLocks noGrp="1"/>
           </p:cNvSpPr>
@@ -7903,84 +7856,86 @@
           <a:bodyPr rtlCol="0"/>
           <a:lstStyle/>
           <a:p>
-            <a:pPr rtl="0"/>
             <a:r>
               <a:rPr lang="en-US" altLang="ko-KR" dirty="0"/>
-              <a:t>3</a:t>
-            </a:r>
-            <a:r>
-              <a:rPr lang="ko-KR" altLang="en-US" dirty="0"/>
-              <a:t>단원</a:t>
-            </a:r>
-            <a:r>
-              <a:rPr lang="en-US" altLang="ko-KR" dirty="0"/>
-              <a:t>: </a:t>
-            </a:r>
-            <a:r>
-              <a:rPr lang="ko-KR" altLang="en-US" dirty="0"/>
-              <a:t>목표</a:t>
-            </a:r>
-          </a:p>
-        </p:txBody>
-      </p:sp>
-      <p:sp>
-        <p:nvSpPr>
-          <p:cNvPr id="3" name="내용 개체 틀 2"/>
-          <p:cNvSpPr>
-            <a:spLocks noGrp="1"/>
-          </p:cNvSpPr>
-          <p:nvPr>
-            <p:ph idx="1"/>
-          </p:nvPr>
-        </p:nvSpPr>
-        <p:spPr/>
+              <a:t>Hyper parameter</a:t>
+            </a:r>
+            <a:endParaRPr lang="ko-KR" altLang="en-US" dirty="0"/>
+          </a:p>
+        </p:txBody>
+      </p:sp>
+      <p:pic>
+        <p:nvPicPr>
+          <p:cNvPr id="3" name="그림 2"/>
+          <p:cNvPicPr>
+            <a:picLocks noChangeAspect="1"/>
+          </p:cNvPicPr>
+          <p:nvPr/>
+        </p:nvPicPr>
+        <p:blipFill>
+          <a:blip r:embed="rId3"/>
+          <a:stretch>
+            <a:fillRect/>
+          </a:stretch>
+        </p:blipFill>
+        <p:spPr>
+          <a:xfrm>
+            <a:off x="4460077" y="2665095"/>
+            <a:ext cx="7981477" cy="2409825"/>
+          </a:xfrm>
+          <a:prstGeom prst="rect">
+            <a:avLst/>
+          </a:prstGeom>
+        </p:spPr>
+      </p:pic>
+      <p:sp>
+        <p:nvSpPr>
+          <p:cNvPr id="7" name="텍스트 개체 틀 5"/>
+          <p:cNvSpPr>
+            <a:spLocks noGrp="1"/>
+          </p:cNvSpPr>
+          <p:nvPr>
+            <p:ph sz="half" idx="1"/>
+          </p:nvPr>
+        </p:nvSpPr>
+        <p:spPr>
+          <a:xfrm>
+            <a:off x="609600" y="2249425"/>
+            <a:ext cx="5384800" cy="4341875"/>
+          </a:xfrm>
+        </p:spPr>
         <p:txBody>
           <a:bodyPr rtlCol="0"/>
           <a:lstStyle/>
           <a:p>
             <a:pPr rtl="0"/>
-            <a:r>
-              <a:rPr lang="ko-KR" altLang="en-US" dirty="0"/>
-              <a:t>이 교육 세션에서 의도하는 결과를 나열합니다</a:t>
-            </a:r>
-            <a:r>
-              <a:rPr lang="en-US" altLang="ko-KR" dirty="0"/>
-              <a:t>.</a:t>
-            </a:r>
-          </a:p>
-          <a:p>
-            <a:pPr rtl="0"/>
-            <a:r>
-              <a:rPr lang="ko-KR" altLang="en-US" dirty="0"/>
-              <a:t>각 목표는 간결해야 하며</a:t>
-            </a:r>
-            <a:r>
-              <a:rPr lang="en-US" altLang="ko-KR" dirty="0"/>
-              <a:t>, </a:t>
-            </a:r>
-            <a:r>
-              <a:rPr lang="ko-KR" altLang="en-US" dirty="0"/>
-              <a:t>동사를 포함해야 하고</a:t>
-            </a:r>
-            <a:r>
-              <a:rPr lang="en-US" altLang="ko-KR" dirty="0"/>
-              <a:t>, </a:t>
-            </a:r>
-            <a:r>
-              <a:rPr lang="ko-KR" altLang="en-US" dirty="0"/>
-              <a:t>측정할 수 있는 결과가 있어야 합니다</a:t>
-            </a:r>
-            <a:r>
-              <a:rPr lang="en-US" altLang="ko-KR" dirty="0"/>
-              <a:t>.</a:t>
-            </a:r>
+            <a:endParaRPr lang="en-US" altLang="ko-KR" dirty="0"/>
+          </a:p>
+          <a:p>
+            <a:pPr rtl="0"/>
+            <a:endParaRPr lang="en-US" altLang="ko-KR" dirty="0" smtClean="0"/>
+          </a:p>
+          <a:p>
+            <a:pPr rtl="0"/>
+            <a:r>
+              <a:rPr lang="en-US" altLang="ko-KR" dirty="0" smtClean="0"/>
+              <a:t>Training set: parameters</a:t>
+            </a:r>
+          </a:p>
+          <a:p>
+            <a:pPr rtl="0"/>
+            <a:r>
+              <a:rPr lang="en-US" altLang="ko-KR" dirty="0" smtClean="0"/>
+              <a:t>Validation set: hyper parameters</a:t>
+            </a:r>
+            <a:endParaRPr lang="en-US" altLang="ko-KR" dirty="0"/>
           </a:p>
         </p:txBody>
       </p:sp>
     </p:spTree>
     <p:extLst>
       <p:ext uri="{BB962C8B-B14F-4D97-AF65-F5344CB8AC3E}">
-        <p14:creationId xmlns:p14="http://schemas.microsoft.com/office/powerpoint/2010/main" val="4155348868"/>
+        <p14:creationId xmlns:p14="http://schemas.microsoft.com/office/powerpoint/2010/main" val="1519909359"/>
       </p:ext>
     </p:extLst>
   </p:cSld>
@@ -7999,6 +7954,13 @@
       </p:transition>
     </mc:Fallback>
   </mc:AlternateContent>
+  <p:timing>
+    <p:tnLst>
+      <p:par>
+        <p:cTn id="1" dur="indefinite" restart="never" nodeType="tmRoot"/>
+      </p:par>
+    </p:tnLst>
+  </p:timing>
 </p:sld>
 </file>
 
@@ -8021,7 +7983,7 @@
       </p:grpSpPr>
       <p:sp>
         <p:nvSpPr>
-          <p:cNvPr id="2" name="제목 1"/>
+          <p:cNvPr id="9" name="제목 8"/>
           <p:cNvSpPr>
             <a:spLocks noGrp="1"/>
           </p:cNvSpPr>
@@ -8034,115 +7996,133 @@
           <a:bodyPr rtlCol="0"/>
           <a:lstStyle/>
           <a:p>
-            <a:pPr rtl="0"/>
             <a:r>
               <a:rPr lang="en-US" altLang="ko-KR" dirty="0"/>
-              <a:t>3</a:t>
+              <a:t>Hyper parameter</a:t>
+            </a:r>
+            <a:endParaRPr lang="ko-KR" altLang="en-US" dirty="0"/>
+          </a:p>
+        </p:txBody>
+      </p:sp>
+      <p:pic>
+        <p:nvPicPr>
+          <p:cNvPr id="3" name="그림 2"/>
+          <p:cNvPicPr>
+            <a:picLocks noChangeAspect="1"/>
+          </p:cNvPicPr>
+          <p:nvPr/>
+        </p:nvPicPr>
+        <p:blipFill>
+          <a:blip r:embed="rId3"/>
+          <a:stretch>
+            <a:fillRect/>
+          </a:stretch>
+        </p:blipFill>
+        <p:spPr>
+          <a:xfrm>
+            <a:off x="5292090" y="3369945"/>
+            <a:ext cx="6515100" cy="666750"/>
+          </a:xfrm>
+          <a:prstGeom prst="rect">
+            <a:avLst/>
+          </a:prstGeom>
+        </p:spPr>
+      </p:pic>
+      <p:sp>
+        <p:nvSpPr>
+          <p:cNvPr id="11" name="텍스트 개체 틀 5"/>
+          <p:cNvSpPr>
+            <a:spLocks noGrp="1"/>
+          </p:cNvSpPr>
+          <p:nvPr>
+            <p:ph sz="half" idx="1"/>
+          </p:nvPr>
+        </p:nvSpPr>
+        <p:spPr>
+          <a:xfrm>
+            <a:off x="665480" y="2209800"/>
+            <a:ext cx="4462780" cy="4341875"/>
+          </a:xfrm>
+        </p:spPr>
+        <p:txBody>
+          <a:bodyPr rtlCol="0"/>
+          <a:lstStyle/>
+          <a:p>
+            <a:endParaRPr lang="en-US" altLang="ko-KR" dirty="0"/>
+          </a:p>
+          <a:p>
+            <a:endParaRPr lang="en-US" altLang="ko-KR" dirty="0"/>
+          </a:p>
+          <a:p>
+            <a:r>
+              <a:rPr lang="en-US" altLang="ko-KR" dirty="0"/>
+              <a:t>Data pool</a:t>
             </a:r>
             <a:r>
               <a:rPr lang="ko-KR" altLang="en-US" dirty="0"/>
-              <a:t>단원</a:t>
+              <a:t>이 너무 작을 </a:t>
+            </a:r>
+            <a:r>
+              <a:rPr lang="ko-KR" altLang="en-US" dirty="0" smtClean="0"/>
+              <a:t>경우</a:t>
+            </a:r>
+            <a:endParaRPr lang="en-US" altLang="ko-KR" dirty="0" smtClean="0"/>
+          </a:p>
+          <a:p>
+            <a:endParaRPr lang="en-US" altLang="ko-KR" dirty="0"/>
+          </a:p>
+          <a:p>
+            <a:r>
+              <a:rPr lang="ko-KR" altLang="en-US" dirty="0"/>
+              <a:t>고정된 </a:t>
             </a:r>
             <a:r>
               <a:rPr lang="en-US" altLang="ko-KR" dirty="0"/>
-              <a:t>: </a:t>
-            </a:r>
-            <a:r>
-              <a:rPr lang="ko-KR" altLang="en-US" dirty="0"/>
-              <a:t>콘텐츠</a:t>
-            </a:r>
-          </a:p>
-        </p:txBody>
-      </p:sp>
-      <p:sp>
-        <p:nvSpPr>
-          <p:cNvPr id="4" name="텍스트 개체 틀 3"/>
-          <p:cNvSpPr>
-            <a:spLocks noGrp="1"/>
-          </p:cNvSpPr>
-          <p:nvPr>
-            <p:ph sz="half" idx="1"/>
-          </p:nvPr>
-        </p:nvSpPr>
-        <p:spPr/>
-        <p:txBody>
-          <a:bodyPr rtlCol="0"/>
-          <a:lstStyle/>
-          <a:p>
-            <a:pPr rtl="0"/>
-            <a:r>
-              <a:rPr lang="ko-KR" altLang="en-US" dirty="0"/>
-              <a:t>여기에 텍스트를 추가합니다</a:t>
+              <a:t>test set</a:t>
+            </a:r>
+            <a:r>
+              <a:rPr lang="ko-KR" altLang="en-US" dirty="0" smtClean="0"/>
+              <a:t>으로 진행한  </a:t>
             </a:r>
             <a:r>
               <a:rPr lang="en-US" altLang="ko-KR" dirty="0"/>
-              <a:t>. </a:t>
-            </a:r>
-          </a:p>
-          <a:p>
-            <a:pPr rtl="0"/>
-            <a:r>
-              <a:rPr lang="ko-KR" altLang="en-US" dirty="0"/>
-              <a:t>오른쪽 열에 그림</a:t>
-            </a:r>
-            <a:r>
-              <a:rPr lang="en-US" altLang="ko-KR" dirty="0"/>
-              <a:t>, </a:t>
-            </a:r>
-            <a:r>
-              <a:rPr lang="ko-KR" altLang="en-US" dirty="0"/>
-              <a:t>차트 또는 기타 콘텐츠를 추가하려면 해당 아이콘을 클릭합니다</a:t>
-            </a:r>
-            <a:r>
-              <a:rPr lang="en-US" altLang="ko-KR" dirty="0"/>
-              <a:t>.</a:t>
-            </a:r>
-          </a:p>
-          <a:p>
-            <a:pPr rtl="0"/>
-            <a:r>
-              <a:rPr lang="ko-KR" altLang="en-US" dirty="0"/>
-              <a:t>슬라이드를 추가하려면 삽입 메뉴의 새 슬라이드를 클릭하거나 </a:t>
-            </a:r>
-            <a:r>
-              <a:rPr lang="en-US" altLang="ko-KR" dirty="0"/>
-              <a:t>CTRL+M</a:t>
-            </a:r>
-            <a:r>
-              <a:rPr lang="ko-KR" altLang="en-US" dirty="0"/>
-              <a:t>을 누릅니다</a:t>
-            </a:r>
-            <a:r>
-              <a:rPr lang="en-US" altLang="ko-KR" dirty="0"/>
-              <a:t>.</a:t>
-            </a:r>
-          </a:p>
-        </p:txBody>
-      </p:sp>
-      <p:sp>
-        <p:nvSpPr>
-          <p:cNvPr id="5" name="내용 개체 틀 4"/>
-          <p:cNvSpPr>
-            <a:spLocks noGrp="1"/>
-          </p:cNvSpPr>
-          <p:nvPr>
-            <p:ph sz="half" idx="2"/>
-          </p:nvPr>
-        </p:nvSpPr>
-        <p:spPr/>
-        <p:txBody>
-          <a:bodyPr rtlCol="0"/>
-          <a:lstStyle/>
-          <a:p>
-            <a:pPr rtl="0"/>
-            <a:endParaRPr lang="ko-KR" altLang="en-US" dirty="0"/>
+              <a:t>performance </a:t>
+            </a:r>
+            <a:r>
+              <a:rPr lang="en-US" altLang="ko-KR" dirty="0" smtClean="0"/>
+              <a:t>measure </a:t>
+            </a:r>
+            <a:r>
+              <a:rPr lang="ko-KR" altLang="en-US" dirty="0" smtClean="0"/>
+              <a:t>로 인해</a:t>
+            </a:r>
+            <a:r>
+              <a:rPr lang="en-US" altLang="ko-KR" dirty="0" smtClean="0"/>
+              <a:t> test set</a:t>
+            </a:r>
+            <a:r>
+              <a:rPr lang="ko-KR" altLang="en-US" dirty="0" smtClean="0"/>
+              <a:t>에 </a:t>
+            </a:r>
+            <a:r>
+              <a:rPr lang="en-US" altLang="ko-KR" dirty="0" smtClean="0"/>
+              <a:t>overfitting </a:t>
+            </a:r>
+            <a:r>
+              <a:rPr lang="ko-KR" altLang="en-US" dirty="0" smtClean="0"/>
+              <a:t>된 경우</a:t>
+            </a:r>
+            <a:endParaRPr lang="en-US" altLang="ko-KR" dirty="0"/>
+          </a:p>
+          <a:p>
+            <a:endParaRPr lang="en-US" altLang="ko-KR" dirty="0"/>
           </a:p>
         </p:txBody>
       </p:sp>
     </p:spTree>
     <p:extLst>
       <p:ext uri="{BB962C8B-B14F-4D97-AF65-F5344CB8AC3E}">
-        <p14:creationId xmlns:p14="http://schemas.microsoft.com/office/powerpoint/2010/main" val="3389132344"/>
+        <p14:creationId xmlns:p14="http://schemas.microsoft.com/office/powerpoint/2010/main" val="3424458358"/>
       </p:ext>
     </p:extLst>
   </p:cSld>
@@ -8161,6 +8141,13 @@
       </p:transition>
     </mc:Fallback>
   </mc:AlternateContent>
+  <p:timing>
+    <p:tnLst>
+      <p:par>
+        <p:cTn id="1" dur="indefinite" restart="never" nodeType="tmRoot"/>
+      </p:par>
+    </p:tnLst>
+  </p:timing>
 </p:sld>
 </file>
 
@@ -8183,7 +8170,7 @@
       </p:grpSpPr>
       <p:sp>
         <p:nvSpPr>
-          <p:cNvPr id="2" name="제목 1"/>
+          <p:cNvPr id="9" name="제목 8"/>
           <p:cNvSpPr>
             <a:spLocks noGrp="1"/>
           </p:cNvSpPr>
@@ -8196,68 +8183,182 @@
           <a:bodyPr rtlCol="0"/>
           <a:lstStyle/>
           <a:p>
-            <a:pPr rtl="0"/>
             <a:r>
               <a:rPr lang="en-US" altLang="ko-KR" dirty="0"/>
-              <a:t>3</a:t>
-            </a:r>
-            <a:r>
-              <a:rPr lang="ko-KR" altLang="en-US" dirty="0"/>
-              <a:t>단원</a:t>
-            </a:r>
-            <a:r>
-              <a:rPr lang="en-US" altLang="ko-KR" dirty="0"/>
-              <a:t>: </a:t>
-            </a:r>
-            <a:r>
-              <a:rPr lang="ko-KR" altLang="en-US" dirty="0"/>
-              <a:t>마무리</a:t>
-            </a:r>
-          </a:p>
-        </p:txBody>
-      </p:sp>
-      <p:sp>
-        <p:nvSpPr>
-          <p:cNvPr id="3" name="텍스트 개체 틀 2"/>
-          <p:cNvSpPr>
-            <a:spLocks noGrp="1"/>
-          </p:cNvSpPr>
-          <p:nvPr>
-            <p:ph idx="1"/>
-          </p:nvPr>
-        </p:nvSpPr>
-        <p:spPr/>
-        <p:txBody>
-          <a:bodyPr rtlCol="0"/>
-          <a:lstStyle/>
-          <a:p>
-            <a:pPr rtl="0"/>
-            <a:r>
-              <a:rPr lang="ko-KR" altLang="en-US" dirty="0"/>
-              <a:t>요점을 요약합니다</a:t>
-            </a:r>
-            <a:r>
-              <a:rPr lang="en-US" altLang="ko-KR" dirty="0"/>
+              <a:t>Hyper parameter</a:t>
+            </a:r>
+            <a:endParaRPr lang="ko-KR" altLang="en-US" dirty="0"/>
+          </a:p>
+        </p:txBody>
+      </p:sp>
+      <p:pic>
+        <p:nvPicPr>
+          <p:cNvPr id="2" name="그림 1"/>
+          <p:cNvPicPr>
+            <a:picLocks noChangeAspect="1"/>
+          </p:cNvPicPr>
+          <p:nvPr/>
+        </p:nvPicPr>
+        <p:blipFill>
+          <a:blip r:embed="rId3"/>
+          <a:stretch>
+            <a:fillRect/>
+          </a:stretch>
+        </p:blipFill>
+        <p:spPr>
+          <a:xfrm>
+            <a:off x="4526280" y="2942082"/>
+            <a:ext cx="7600950" cy="3200400"/>
+          </a:xfrm>
+          <a:prstGeom prst="rect">
+            <a:avLst/>
+          </a:prstGeom>
+        </p:spPr>
+      </p:pic>
+      <p:sp>
+        <p:nvSpPr>
+          <p:cNvPr id="10" name="텍스트 개체 틀 5"/>
+          <p:cNvSpPr>
+            <a:spLocks noGrp="1"/>
+          </p:cNvSpPr>
+          <p:nvPr>
+            <p:ph sz="half" idx="1"/>
+          </p:nvPr>
+        </p:nvSpPr>
+        <p:spPr>
+          <a:xfrm>
+            <a:off x="609600" y="2278380"/>
+            <a:ext cx="3916680" cy="4312920"/>
+          </a:xfrm>
+        </p:spPr>
+        <p:txBody>
+          <a:bodyPr rtlCol="0">
+            <a:normAutofit/>
+          </a:bodyPr>
+          <a:lstStyle/>
+          <a:p>
+            <a:pPr marL="109728" indent="0" rtl="0">
+              <a:buNone/>
+            </a:pPr>
+            <a:r>
+              <a:rPr lang="ko-KR" altLang="en-US" dirty="0" smtClean="0"/>
+              <a:t>장점</a:t>
+            </a:r>
+            <a:endParaRPr lang="en-US" altLang="ko-KR" dirty="0" smtClean="0"/>
+          </a:p>
+          <a:p>
+            <a:pPr marL="109728" indent="0" rtl="0">
+              <a:buNone/>
+            </a:pPr>
+            <a:r>
+              <a:rPr lang="en-US" altLang="ko-KR" dirty="0" smtClean="0"/>
+              <a:t>- </a:t>
+            </a:r>
+            <a:r>
+              <a:rPr lang="ko-KR" altLang="en-US" dirty="0" smtClean="0"/>
+              <a:t>모든 </a:t>
+            </a:r>
+            <a:r>
+              <a:rPr lang="ko-KR" altLang="en-US" dirty="0" smtClean="0"/>
+              <a:t>데이터 셋을 평가에 활용할 수 있다</a:t>
+            </a:r>
+            <a:r>
+              <a:rPr lang="en-US" altLang="ko-KR" dirty="0" smtClean="0"/>
               <a:t>.</a:t>
             </a:r>
           </a:p>
           <a:p>
-            <a:pPr rtl="0"/>
-            <a:r>
-              <a:rPr lang="ko-KR" altLang="en-US" dirty="0"/>
-              <a:t>질문 시간을 제공합니다</a:t>
-            </a:r>
-            <a:r>
-              <a:rPr lang="en-US" altLang="ko-KR" dirty="0"/>
+            <a:pPr rtl="0">
+              <a:buFontTx/>
+              <a:buChar char="-"/>
+            </a:pPr>
+            <a:r>
+              <a:rPr lang="ko-KR" altLang="en-US" dirty="0" smtClean="0"/>
+              <a:t>평가에 사용되는 데이터 편중을 막을 수 있다</a:t>
+            </a:r>
+            <a:r>
+              <a:rPr lang="en-US" altLang="ko-KR" dirty="0" smtClean="0"/>
               <a:t>.</a:t>
             </a:r>
+          </a:p>
+          <a:p>
+            <a:pPr rtl="0">
+              <a:buFontTx/>
+              <a:buChar char="-"/>
+            </a:pPr>
+            <a:r>
+              <a:rPr lang="ko-KR" altLang="en-US" dirty="0" smtClean="0"/>
+              <a:t>좀 더 일반화된 모델을 만들 수 있다</a:t>
+            </a:r>
+            <a:r>
+              <a:rPr lang="en-US" altLang="ko-KR" dirty="0" smtClean="0"/>
+              <a:t>.</a:t>
+            </a:r>
+          </a:p>
+          <a:p>
+            <a:pPr rtl="0">
+              <a:buFontTx/>
+              <a:buChar char="-"/>
+            </a:pPr>
+            <a:r>
+              <a:rPr lang="ko-KR" altLang="en-US" dirty="0" smtClean="0"/>
+              <a:t>데이터 부족으로 인한 </a:t>
+            </a:r>
+            <a:r>
+              <a:rPr lang="en-US" altLang="ko-KR" dirty="0" err="1" smtClean="0"/>
+              <a:t>underfitting</a:t>
+            </a:r>
+            <a:r>
+              <a:rPr lang="ko-KR" altLang="en-US" dirty="0" smtClean="0"/>
+              <a:t>을 방지할 수 있다</a:t>
+            </a:r>
+            <a:r>
+              <a:rPr lang="en-US" altLang="ko-KR" dirty="0" smtClean="0"/>
+              <a:t>.</a:t>
+            </a:r>
+          </a:p>
+          <a:p>
+            <a:pPr marL="109728" indent="0" rtl="0">
+              <a:buNone/>
+            </a:pPr>
+            <a:r>
+              <a:rPr lang="ko-KR" altLang="en-US" dirty="0" smtClean="0"/>
+              <a:t>단점</a:t>
+            </a:r>
+            <a:endParaRPr lang="en-US" altLang="ko-KR" dirty="0" smtClean="0"/>
+          </a:p>
+          <a:p>
+            <a:pPr marL="109728" indent="0" rtl="0">
+              <a:buNone/>
+            </a:pPr>
+            <a:r>
+              <a:rPr lang="en-US" altLang="ko-KR" dirty="0" smtClean="0"/>
+              <a:t>- Iteration </a:t>
+            </a:r>
+            <a:r>
+              <a:rPr lang="ko-KR" altLang="en-US" dirty="0" smtClean="0"/>
+              <a:t>횟수가 많아 훈련</a:t>
+            </a:r>
+            <a:r>
+              <a:rPr lang="en-US" altLang="ko-KR" dirty="0" smtClean="0"/>
+              <a:t>, </a:t>
+            </a:r>
+            <a:r>
+              <a:rPr lang="ko-KR" altLang="en-US" dirty="0" smtClean="0"/>
+              <a:t>평가 시간이 오래 걸린다</a:t>
+            </a:r>
+            <a:r>
+              <a:rPr lang="en-US" altLang="ko-KR" smtClean="0"/>
+              <a:t>.</a:t>
+            </a:r>
+            <a:endParaRPr lang="en-US" altLang="ko-KR" dirty="0"/>
           </a:p>
         </p:txBody>
       </p:sp>
     </p:spTree>
     <p:extLst>
       <p:ext uri="{BB962C8B-B14F-4D97-AF65-F5344CB8AC3E}">
-        <p14:creationId xmlns:p14="http://schemas.microsoft.com/office/powerpoint/2010/main" val="1531528155"/>
+        <p14:creationId xmlns:p14="http://schemas.microsoft.com/office/powerpoint/2010/main" val="3033980367"/>
       </p:ext>
     </p:extLst>
   </p:cSld>
@@ -8276,6 +8377,13 @@
       </p:transition>
     </mc:Fallback>
   </mc:AlternateContent>
+  <p:timing>
+    <p:tnLst>
+      <p:par>
+        <p:cTn id="1" dur="indefinite" restart="never" nodeType="tmRoot"/>
+      </p:par>
+    </p:tnLst>
+  </p:timing>
 </p:sld>
 </file>
 
@@ -8298,12 +8406,12 @@
       </p:grpSpPr>
       <p:sp>
         <p:nvSpPr>
-          <p:cNvPr id="2" name="제목 1"/>
-          <p:cNvSpPr>
-            <a:spLocks noGrp="1"/>
-          </p:cNvSpPr>
-          <p:nvPr>
-            <p:ph type="title"/>
+          <p:cNvPr id="3" name="부제목 2"/>
+          <p:cNvSpPr>
+            <a:spLocks noGrp="1"/>
+          </p:cNvSpPr>
+          <p:nvPr>
+            <p:ph type="subTitle" idx="1"/>
           </p:nvPr>
         </p:nvSpPr>
         <p:spPr/>
@@ -8312,77 +8420,33 @@
           <a:lstStyle/>
           <a:p>
             <a:pPr rtl="0"/>
-            <a:r>
-              <a:rPr lang="ko-KR" altLang="en-US" dirty="0"/>
-              <a:t>교육 요약</a:t>
-            </a:r>
-          </a:p>
-        </p:txBody>
-      </p:sp>
-      <p:sp>
-        <p:nvSpPr>
-          <p:cNvPr id="3" name="내용 개체 틀 2"/>
-          <p:cNvSpPr>
-            <a:spLocks noGrp="1"/>
-          </p:cNvSpPr>
-          <p:nvPr>
-            <p:ph idx="1"/>
-          </p:nvPr>
-        </p:nvSpPr>
-        <p:spPr/>
-        <p:txBody>
-          <a:bodyPr rtlCol="0"/>
-          <a:lstStyle/>
-          <a:p>
-            <a:pPr rtl="0"/>
-            <a:r>
-              <a:rPr lang="ko-KR" altLang="en-US" dirty="0"/>
-              <a:t>각 단원의 요점을 나열합니다</a:t>
-            </a:r>
-            <a:r>
-              <a:rPr lang="en-US" altLang="ko-KR" dirty="0"/>
-              <a:t>.</a:t>
-            </a:r>
-          </a:p>
-          <a:p>
-            <a:pPr rtl="0"/>
-            <a:r>
-              <a:rPr lang="ko-KR" altLang="en-US" dirty="0"/>
-              <a:t>주제에 대한 추가 정보 리소스를 제공합니다</a:t>
-            </a:r>
-            <a:r>
-              <a:rPr lang="en-US" altLang="ko-KR" dirty="0"/>
-              <a:t>.</a:t>
-            </a:r>
-          </a:p>
-          <a:p>
-            <a:pPr lvl="1" rtl="0"/>
-            <a:r>
-              <a:rPr lang="ko-KR" altLang="en-US" dirty="0"/>
-              <a:t>이 슬라이드에 리소스를 나열합니다</a:t>
-            </a:r>
-            <a:r>
-              <a:rPr lang="en-US" altLang="ko-KR" dirty="0"/>
-              <a:t>.</a:t>
-            </a:r>
-          </a:p>
-          <a:p>
-            <a:pPr lvl="1" rtl="0"/>
-            <a:r>
-              <a:rPr lang="ko-KR" altLang="en-US" dirty="0"/>
-              <a:t>추가 리소스 자료와 함께 유인물을 제공합니다</a:t>
-            </a:r>
-            <a:r>
-              <a:rPr lang="en-US" altLang="ko-KR" dirty="0"/>
-              <a:t>.</a:t>
-            </a:r>
+            <a:endParaRPr lang="ko-KR" altLang="en-US" dirty="0"/>
+          </a:p>
+        </p:txBody>
+      </p:sp>
+      <p:sp>
+        <p:nvSpPr>
+          <p:cNvPr id="4" name="제목 3"/>
+          <p:cNvSpPr>
+            <a:spLocks noGrp="1"/>
+          </p:cNvSpPr>
+          <p:nvPr>
+            <p:ph type="ctrTitle"/>
+          </p:nvPr>
+        </p:nvSpPr>
+        <p:spPr/>
+        <p:txBody>
+          <a:bodyPr/>
+          <a:lstStyle/>
+          <a:p>
+            <a:endParaRPr lang="ko-KR" altLang="en-US"/>
           </a:p>
         </p:txBody>
       </p:sp>
     </p:spTree>
     <p:extLst>
       <p:ext uri="{BB962C8B-B14F-4D97-AF65-F5344CB8AC3E}">
-        <p14:creationId xmlns:p14="http://schemas.microsoft.com/office/powerpoint/2010/main" val="3809512885"/>
+        <p14:creationId xmlns:p14="http://schemas.microsoft.com/office/powerpoint/2010/main" val="2300001043"/>
       </p:ext>
     </p:extLst>
   </p:cSld>
@@ -8401,109 +8465,13 @@
       </p:transition>
     </mc:Fallback>
   </mc:AlternateContent>
-</p:sld>
-</file>
-
-<file path=ppt/slides/slide19.xml><?xml version="1.0" encoding="utf-8"?>
-<p:sld xmlns:a="http://schemas.openxmlformats.org/drawingml/2006/main" xmlns:r="http://schemas.openxmlformats.org/officeDocument/2006/relationships" xmlns:p="http://schemas.openxmlformats.org/presentationml/2006/main">
-  <p:cSld>
-    <p:spTree>
-      <p:nvGrpSpPr>
-        <p:cNvPr id="1" name=""/>
-        <p:cNvGrpSpPr/>
-        <p:nvPr/>
-      </p:nvGrpSpPr>
-      <p:grpSpPr>
-        <a:xfrm>
-          <a:off x="0" y="0"/>
-          <a:ext cx="0" cy="0"/>
-          <a:chOff x="0" y="0"/>
-          <a:chExt cx="0" cy="0"/>
-        </a:xfrm>
-      </p:grpSpPr>
-      <p:sp>
-        <p:nvSpPr>
-          <p:cNvPr id="2" name="제목 1"/>
-          <p:cNvSpPr>
-            <a:spLocks noGrp="1"/>
-          </p:cNvSpPr>
-          <p:nvPr>
-            <p:ph type="title"/>
-          </p:nvPr>
-        </p:nvSpPr>
-        <p:spPr/>
-        <p:txBody>
-          <a:bodyPr rtlCol="0"/>
-          <a:lstStyle/>
-          <a:p>
-            <a:pPr rtl="0"/>
-            <a:r>
-              <a:rPr lang="ko-KR" altLang="en-US" dirty="0"/>
-              <a:t>평가</a:t>
-            </a:r>
-          </a:p>
-        </p:txBody>
-      </p:sp>
-      <p:sp>
-        <p:nvSpPr>
-          <p:cNvPr id="3" name="내용 개체 틀 2"/>
-          <p:cNvSpPr>
-            <a:spLocks noGrp="1"/>
-          </p:cNvSpPr>
-          <p:nvPr>
-            <p:ph idx="1"/>
-          </p:nvPr>
-        </p:nvSpPr>
-        <p:spPr/>
-        <p:txBody>
-          <a:bodyPr rtlCol="0"/>
-          <a:lstStyle/>
-          <a:p>
-            <a:pPr rtl="0"/>
-            <a:r>
-              <a:rPr lang="ko-KR" altLang="en-US" dirty="0"/>
-              <a:t>퀴즈나 과제를 준비하여 참가자가 얼마나 많은 정보를 학습했는지 평가합니다</a:t>
-            </a:r>
-            <a:r>
-              <a:rPr lang="en-US" altLang="ko-KR" dirty="0"/>
-              <a:t>.</a:t>
-            </a:r>
-          </a:p>
-          <a:p>
-            <a:pPr rtl="0"/>
-            <a:r>
-              <a:rPr lang="ko-KR" altLang="en-US" dirty="0"/>
-              <a:t>참가자에게 설문 조사를 실시하여 교육이 유용했는지 알아봅니다</a:t>
-            </a:r>
-            <a:r>
-              <a:rPr lang="en-US" altLang="ko-KR" dirty="0"/>
-              <a:t>.</a:t>
-            </a:r>
-          </a:p>
-        </p:txBody>
-      </p:sp>
-    </p:spTree>
-    <p:extLst>
-      <p:ext uri="{BB962C8B-B14F-4D97-AF65-F5344CB8AC3E}">
-        <p14:creationId xmlns:p14="http://schemas.microsoft.com/office/powerpoint/2010/main" val="687654895"/>
-      </p:ext>
-    </p:extLst>
-  </p:cSld>
-  <p:clrMapOvr>
-    <a:masterClrMapping/>
-  </p:clrMapOvr>
-  <mc:AlternateContent xmlns:mc="http://schemas.openxmlformats.org/markup-compatibility/2006" xmlns:p14="http://schemas.microsoft.com/office/powerpoint/2010/main">
-    <mc:Choice Requires="p14">
-      <p:transition spd="med" p14:dur="700">
-        <p:fade/>
-      </p:transition>
-    </mc:Choice>
-    <mc:Fallback xmlns="">
-      <p:transition spd="med">
-        <p:fade/>
-      </p:transition>
-    </mc:Fallback>
-  </mc:AlternateContent>
+  <p:timing>
+    <p:tnLst>
+      <p:par>
+        <p:cTn id="1" dur="indefinite" restart="never" nodeType="tmRoot"/>
+      </p:par>
+    </p:tnLst>
+  </p:timing>
 </p:sld>
 </file>
 
@@ -8576,10 +8544,9 @@
           <a:p>
             <a:pPr rtl="0"/>
             <a:r>
-              <a:rPr lang="en-US" altLang="ko-KR" dirty="0" err="1" smtClean="0"/>
-              <a:t>Hyperparameters</a:t>
-            </a:r>
-            <a:endParaRPr lang="en-US" altLang="ko-KR" dirty="0" smtClean="0"/>
+              <a:rPr lang="en-US" altLang="ko-KR" dirty="0" smtClean="0"/>
+              <a:t>Hyper parameters</a:t>
+            </a:r>
           </a:p>
           <a:p>
             <a:pPr rtl="0"/>
@@ -8667,21 +8634,10 @@
           <a:p>
             <a:pPr rtl="0"/>
             <a:r>
-              <a:rPr lang="en-US" altLang="ko-KR" dirty="0"/>
-              <a:t>1</a:t>
-            </a:r>
-            <a:r>
-              <a:rPr lang="ko-KR" altLang="en-US" dirty="0"/>
-              <a:t>단원</a:t>
-            </a:r>
-            <a:r>
-              <a:rPr lang="en-US" altLang="ko-KR" dirty="0"/>
-              <a:t>: </a:t>
-            </a:r>
-            <a:r>
-              <a:rPr lang="ko-KR" altLang="en-US" dirty="0"/>
-              <a:t>목표</a:t>
-            </a:r>
+              <a:rPr lang="en-US" altLang="ko-KR" dirty="0" smtClean="0"/>
+              <a:t>Regularization</a:t>
+            </a:r>
+            <a:endParaRPr lang="ko-KR" altLang="en-US" dirty="0"/>
           </a:p>
         </p:txBody>
       </p:sp>
@@ -8697,79 +8653,58 @@
         </p:nvSpPr>
         <p:spPr/>
         <p:txBody>
-          <a:bodyPr rtlCol="0"/>
-          <a:lstStyle/>
-          <a:p>
-            <a:pPr rtl="0"/>
-            <a:r>
-              <a:rPr lang="ko-KR" altLang="en-US" dirty="0"/>
-              <a:t>이 교육 세션에서 의도하는 결과를 나열합니다</a:t>
-            </a:r>
-            <a:r>
-              <a:rPr lang="en-US" altLang="ko-KR" dirty="0"/>
+          <a:bodyPr rtlCol="0">
+            <a:normAutofit/>
+          </a:bodyPr>
+          <a:lstStyle/>
+          <a:p>
+            <a:pPr marL="109728" indent="0" rtl="0">
+              <a:buNone/>
+            </a:pPr>
+            <a:r>
+              <a:rPr lang="ko-KR" altLang="en-US" sz="3200" dirty="0" smtClean="0"/>
+              <a:t>현대 기계 학습이 높은 일반화 능력을 확보하는 </a:t>
+            </a:r>
+            <a:endParaRPr lang="en-US" altLang="ko-KR" sz="3200" dirty="0" smtClean="0"/>
+          </a:p>
+          <a:p>
+            <a:pPr marL="109728" indent="0" rtl="0">
+              <a:buNone/>
+            </a:pPr>
+            <a:r>
+              <a:rPr lang="ko-KR" altLang="en-US" sz="3200" dirty="0" smtClean="0"/>
+              <a:t>기본적인 접근방법은 용량이 충분히 큰 모델에 </a:t>
+            </a:r>
+            <a:endParaRPr lang="en-US" altLang="ko-KR" sz="3200" dirty="0" smtClean="0"/>
+          </a:p>
+          <a:p>
+            <a:pPr marL="109728" indent="0" rtl="0">
+              <a:buNone/>
+            </a:pPr>
+            <a:r>
+              <a:rPr lang="ko-KR" altLang="en-US" sz="3200" dirty="0" smtClean="0"/>
+              <a:t>여러 가지 규제 </a:t>
+            </a:r>
+            <a:r>
+              <a:rPr lang="en-US" altLang="ko-KR" sz="3200" dirty="0" smtClean="0"/>
+              <a:t>(Regularization) </a:t>
+            </a:r>
+            <a:r>
+              <a:rPr lang="ko-KR" altLang="en-US" sz="3200" dirty="0" smtClean="0"/>
+              <a:t>기법을 적용하는 것이다</a:t>
+            </a:r>
+            <a:r>
+              <a:rPr lang="en-US" altLang="ko-KR" sz="3200" dirty="0" smtClean="0"/>
               <a:t>.</a:t>
             </a:r>
-          </a:p>
-          <a:p>
-            <a:pPr rtl="0"/>
-            <a:r>
-              <a:rPr lang="ko-KR" altLang="en-US" dirty="0"/>
-              <a:t>각 목표는 간결해야 하며</a:t>
-            </a:r>
-            <a:r>
-              <a:rPr lang="en-US" altLang="ko-KR" dirty="0"/>
-              <a:t>, </a:t>
-            </a:r>
-            <a:r>
-              <a:rPr lang="ko-KR" altLang="en-US" dirty="0"/>
-              <a:t>동사를 포함해야 하고</a:t>
-            </a:r>
-            <a:r>
-              <a:rPr lang="en-US" altLang="ko-KR" dirty="0"/>
-              <a:t>, </a:t>
-            </a:r>
-            <a:r>
-              <a:rPr lang="ko-KR" altLang="en-US" dirty="0"/>
-              <a:t>측정할 수 있는 결과가 있어야 합니다</a:t>
-            </a:r>
-            <a:r>
-              <a:rPr lang="en-US" altLang="ko-KR" dirty="0"/>
-              <a:t>.</a:t>
-            </a:r>
-          </a:p>
-          <a:p>
-            <a:pPr rtl="0"/>
-            <a:r>
-              <a:rPr lang="ko-KR" altLang="en-US" dirty="0"/>
-              <a:t>팁</a:t>
-            </a:r>
-            <a:r>
-              <a:rPr lang="en-US" altLang="ko-KR" dirty="0"/>
-              <a:t>: </a:t>
-            </a:r>
-            <a:r>
-              <a:rPr lang="ko-KR" altLang="en-US" dirty="0"/>
-              <a:t>아래 창의 메모를 클릭하고 스크롤하여 예를 보거나</a:t>
-            </a:r>
-            <a:r>
-              <a:rPr lang="en-US" altLang="ko-KR" dirty="0"/>
-              <a:t>, </a:t>
-            </a:r>
-            <a:r>
-              <a:rPr lang="ko-KR" altLang="en-US" dirty="0"/>
-              <a:t>발표자만의 메모를 추가합니다</a:t>
-            </a:r>
-            <a:r>
-              <a:rPr lang="en-US" altLang="ko-KR" dirty="0"/>
-              <a:t>.</a:t>
-            </a:r>
+            <a:endParaRPr lang="en-US" altLang="ko-KR" sz="3200" dirty="0"/>
           </a:p>
         </p:txBody>
       </p:sp>
     </p:spTree>
     <p:extLst>
       <p:ext uri="{BB962C8B-B14F-4D97-AF65-F5344CB8AC3E}">
-        <p14:creationId xmlns:p14="http://schemas.microsoft.com/office/powerpoint/2010/main" val="384888077"/>
+        <p14:creationId xmlns:p14="http://schemas.microsoft.com/office/powerpoint/2010/main" val="1163666497"/>
       </p:ext>
     </p:extLst>
   </p:cSld>
@@ -8830,139 +8765,6 @@
           <a:bodyPr rtlCol="0"/>
           <a:lstStyle/>
           <a:p>
-            <a:pPr rtl="0"/>
-            <a:r>
-              <a:rPr lang="en-US" altLang="ko-KR" dirty="0" smtClean="0"/>
-              <a:t>Regularization</a:t>
-            </a:r>
-            <a:endParaRPr lang="ko-KR" altLang="en-US" dirty="0"/>
-          </a:p>
-        </p:txBody>
-      </p:sp>
-      <p:sp>
-        <p:nvSpPr>
-          <p:cNvPr id="3" name="내용 개체 틀 2"/>
-          <p:cNvSpPr>
-            <a:spLocks noGrp="1"/>
-          </p:cNvSpPr>
-          <p:nvPr>
-            <p:ph idx="1"/>
-          </p:nvPr>
-        </p:nvSpPr>
-        <p:spPr/>
-        <p:txBody>
-          <a:bodyPr rtlCol="0">
-            <a:normAutofit/>
-          </a:bodyPr>
-          <a:lstStyle/>
-          <a:p>
-            <a:pPr marL="109728" indent="0" rtl="0">
-              <a:buNone/>
-            </a:pPr>
-            <a:r>
-              <a:rPr lang="ko-KR" altLang="en-US" sz="3200" dirty="0" smtClean="0"/>
-              <a:t>현대 기계 학습이 높은 일반화 능력을 확보하는 </a:t>
-            </a:r>
-            <a:endParaRPr lang="en-US" altLang="ko-KR" sz="3200" dirty="0" smtClean="0"/>
-          </a:p>
-          <a:p>
-            <a:pPr marL="109728" indent="0" rtl="0">
-              <a:buNone/>
-            </a:pPr>
-            <a:r>
-              <a:rPr lang="ko-KR" altLang="en-US" sz="3200" dirty="0" smtClean="0"/>
-              <a:t>기본적인 접근방법은 용량이 충분히 큰 모델에 </a:t>
-            </a:r>
-            <a:endParaRPr lang="en-US" altLang="ko-KR" sz="3200" dirty="0" smtClean="0"/>
-          </a:p>
-          <a:p>
-            <a:pPr marL="109728" indent="0" rtl="0">
-              <a:buNone/>
-            </a:pPr>
-            <a:r>
-              <a:rPr lang="ko-KR" altLang="en-US" sz="3200" dirty="0" smtClean="0"/>
-              <a:t>여러 가지 규제 </a:t>
-            </a:r>
-            <a:r>
-              <a:rPr lang="en-US" altLang="ko-KR" sz="3200" dirty="0" smtClean="0"/>
-              <a:t>(Regularization) </a:t>
-            </a:r>
-            <a:r>
-              <a:rPr lang="ko-KR" altLang="en-US" sz="3200" dirty="0" smtClean="0"/>
-              <a:t>기법을 적용하는 것이다</a:t>
-            </a:r>
-            <a:r>
-              <a:rPr lang="en-US" altLang="ko-KR" sz="3200" dirty="0" smtClean="0"/>
-              <a:t>.</a:t>
-            </a:r>
-            <a:endParaRPr lang="en-US" altLang="ko-KR" sz="3200" dirty="0"/>
-          </a:p>
-        </p:txBody>
-      </p:sp>
-    </p:spTree>
-    <p:extLst>
-      <p:ext uri="{BB962C8B-B14F-4D97-AF65-F5344CB8AC3E}">
-        <p14:creationId xmlns:p14="http://schemas.microsoft.com/office/powerpoint/2010/main" val="1163666497"/>
-      </p:ext>
-    </p:extLst>
-  </p:cSld>
-  <p:clrMapOvr>
-    <a:masterClrMapping/>
-  </p:clrMapOvr>
-  <mc:AlternateContent xmlns:mc="http://schemas.openxmlformats.org/markup-compatibility/2006" xmlns:p14="http://schemas.microsoft.com/office/powerpoint/2010/main">
-    <mc:Choice Requires="p14">
-      <p:transition spd="med" p14:dur="700">
-        <p:fade/>
-      </p:transition>
-    </mc:Choice>
-    <mc:Fallback xmlns="">
-      <p:transition spd="med">
-        <p:fade/>
-      </p:transition>
-    </mc:Fallback>
-  </mc:AlternateContent>
-  <p:timing>
-    <p:tnLst>
-      <p:par>
-        <p:cTn id="1" dur="indefinite" restart="never" nodeType="tmRoot"/>
-      </p:par>
-    </p:tnLst>
-  </p:timing>
-</p:sld>
-</file>
-
-<file path=ppt/slides/slide5.xml><?xml version="1.0" encoding="utf-8"?>
-<p:sld xmlns:a="http://schemas.openxmlformats.org/drawingml/2006/main" xmlns:r="http://schemas.openxmlformats.org/officeDocument/2006/relationships" xmlns:p="http://schemas.openxmlformats.org/presentationml/2006/main">
-  <p:cSld>
-    <p:spTree>
-      <p:nvGrpSpPr>
-        <p:cNvPr id="1" name=""/>
-        <p:cNvGrpSpPr/>
-        <p:nvPr/>
-      </p:nvGrpSpPr>
-      <p:grpSpPr>
-        <a:xfrm>
-          <a:off x="0" y="0"/>
-          <a:ext cx="0" cy="0"/>
-          <a:chOff x="0" y="0"/>
-          <a:chExt cx="0" cy="0"/>
-        </a:xfrm>
-      </p:grpSpPr>
-      <p:sp>
-        <p:nvSpPr>
-          <p:cNvPr id="2" name="제목 1"/>
-          <p:cNvSpPr>
-            <a:spLocks noGrp="1"/>
-          </p:cNvSpPr>
-          <p:nvPr>
-            <p:ph type="title"/>
-          </p:nvPr>
-        </p:nvSpPr>
-        <p:spPr/>
-        <p:txBody>
-          <a:bodyPr rtlCol="0"/>
-          <a:lstStyle/>
-          <a:p>
             <a:r>
               <a:rPr lang="en-US" altLang="ko-KR" dirty="0"/>
               <a:t>Regularization</a:t>
@@ -9073,7 +8875,7 @@
 </p:sld>
 </file>
 
-<file path=ppt/slides/slide6.xml><?xml version="1.0" encoding="utf-8"?>
+<file path=ppt/slides/slide5.xml><?xml version="1.0" encoding="utf-8"?>
 <p:sld xmlns:a="http://schemas.openxmlformats.org/drawingml/2006/main" xmlns:r="http://schemas.openxmlformats.org/officeDocument/2006/relationships" xmlns:p="http://schemas.openxmlformats.org/presentationml/2006/main">
   <p:cSld>
     <p:spTree>
@@ -9265,7 +9067,7 @@
 </p:sld>
 </file>
 
-<file path=ppt/slides/slide7.xml><?xml version="1.0" encoding="utf-8"?>
+<file path=ppt/slides/slide6.xml><?xml version="1.0" encoding="utf-8"?>
 <p:sld xmlns:a="http://schemas.openxmlformats.org/drawingml/2006/main" xmlns:r="http://schemas.openxmlformats.org/officeDocument/2006/relationships" xmlns:p="http://schemas.openxmlformats.org/presentationml/2006/main">
   <p:cSld>
     <p:spTree>
@@ -9457,7 +9259,7 @@
 </p:sld>
 </file>
 
-<file path=ppt/slides/slide8.xml><?xml version="1.0" encoding="utf-8"?>
+<file path=ppt/slides/slide7.xml><?xml version="1.0" encoding="utf-8"?>
 <p:sld xmlns:a="http://schemas.openxmlformats.org/drawingml/2006/main" xmlns:r="http://schemas.openxmlformats.org/officeDocument/2006/relationships" xmlns:p="http://schemas.openxmlformats.org/presentationml/2006/main">
   <p:cSld>
     <p:spTree>
@@ -9635,7 +9437,7 @@
 </p:sld>
 </file>
 
-<file path=ppt/slides/slide9.xml><?xml version="1.0" encoding="utf-8"?>
+<file path=ppt/slides/slide8.xml><?xml version="1.0" encoding="utf-8"?>
 <p:sld xmlns:a="http://schemas.openxmlformats.org/drawingml/2006/main" xmlns:r="http://schemas.openxmlformats.org/officeDocument/2006/relationships" xmlns:p="http://schemas.openxmlformats.org/presentationml/2006/main">
   <p:cSld>
     <p:spTree>
@@ -9799,6 +9601,213 @@
     <p:extLst>
       <p:ext uri="{BB962C8B-B14F-4D97-AF65-F5344CB8AC3E}">
         <p14:creationId xmlns:p14="http://schemas.microsoft.com/office/powerpoint/2010/main" val="3939351569"/>
+      </p:ext>
+    </p:extLst>
+  </p:cSld>
+  <p:clrMapOvr>
+    <a:masterClrMapping/>
+  </p:clrMapOvr>
+  <mc:AlternateContent xmlns:mc="http://schemas.openxmlformats.org/markup-compatibility/2006" xmlns:p14="http://schemas.microsoft.com/office/powerpoint/2010/main">
+    <mc:Choice Requires="p14">
+      <p:transition spd="med" p14:dur="700">
+        <p:fade/>
+      </p:transition>
+    </mc:Choice>
+    <mc:Fallback xmlns="">
+      <p:transition spd="med">
+        <p:fade/>
+      </p:transition>
+    </mc:Fallback>
+  </mc:AlternateContent>
+  <p:timing>
+    <p:tnLst>
+      <p:par>
+        <p:cTn id="1" dur="indefinite" restart="never" nodeType="tmRoot"/>
+      </p:par>
+    </p:tnLst>
+  </p:timing>
+</p:sld>
+</file>
+
+<file path=ppt/slides/slide9.xml><?xml version="1.0" encoding="utf-8"?>
+<p:sld xmlns:a="http://schemas.openxmlformats.org/drawingml/2006/main" xmlns:r="http://schemas.openxmlformats.org/officeDocument/2006/relationships" xmlns:p="http://schemas.openxmlformats.org/presentationml/2006/main">
+  <p:cSld>
+    <p:spTree>
+      <p:nvGrpSpPr>
+        <p:cNvPr id="1" name=""/>
+        <p:cNvGrpSpPr/>
+        <p:nvPr/>
+      </p:nvGrpSpPr>
+      <p:grpSpPr>
+        <a:xfrm>
+          <a:off x="0" y="0"/>
+          <a:ext cx="0" cy="0"/>
+          <a:chOff x="0" y="0"/>
+          <a:chExt cx="0" cy="0"/>
+        </a:xfrm>
+      </p:grpSpPr>
+      <p:sp>
+        <p:nvSpPr>
+          <p:cNvPr id="9" name="제목 8"/>
+          <p:cNvSpPr>
+            <a:spLocks noGrp="1"/>
+          </p:cNvSpPr>
+          <p:nvPr>
+            <p:ph type="title"/>
+          </p:nvPr>
+        </p:nvSpPr>
+        <p:spPr>
+          <a:xfrm>
+            <a:off x="554736" y="795528"/>
+            <a:ext cx="10972800" cy="1066800"/>
+          </a:xfrm>
+        </p:spPr>
+        <p:txBody>
+          <a:bodyPr rtlCol="0"/>
+          <a:lstStyle/>
+          <a:p>
+            <a:pPr rtl="0"/>
+            <a:r>
+              <a:rPr lang="ko-KR" altLang="en-US" dirty="0" smtClean="0"/>
+              <a:t>가중치 감쇠</a:t>
+            </a:r>
+            <a:endParaRPr lang="ko-KR" altLang="en-US" dirty="0"/>
+          </a:p>
+        </p:txBody>
+      </p:sp>
+      <p:sp>
+        <p:nvSpPr>
+          <p:cNvPr id="6" name="텍스트 개체 틀 5"/>
+          <p:cNvSpPr>
+            <a:spLocks noGrp="1"/>
+          </p:cNvSpPr>
+          <p:nvPr>
+            <p:ph sz="half" idx="1"/>
+          </p:nvPr>
+        </p:nvSpPr>
+        <p:spPr>
+          <a:xfrm>
+            <a:off x="5830824" y="3127249"/>
+            <a:ext cx="5384800" cy="4341875"/>
+          </a:xfrm>
+        </p:spPr>
+        <p:txBody>
+          <a:bodyPr rtlCol="0">
+            <a:normAutofit/>
+          </a:bodyPr>
+          <a:lstStyle/>
+          <a:p>
+            <a:pPr rtl="0"/>
+            <a:r>
+              <a:rPr lang="ko-KR" altLang="en-US" sz="2200" dirty="0" smtClean="0"/>
+              <a:t>곡선의 굴곡 </a:t>
+            </a:r>
+            <a:r>
+              <a:rPr lang="en-US" altLang="ko-KR" sz="2200" dirty="0" smtClean="0"/>
+              <a:t>: </a:t>
+            </a:r>
+            <a:r>
+              <a:rPr lang="ko-KR" altLang="en-US" sz="2200" dirty="0" smtClean="0"/>
+              <a:t>매우 심함</a:t>
+            </a:r>
+            <a:endParaRPr lang="en-US" altLang="ko-KR" sz="2200" dirty="0" smtClean="0"/>
+          </a:p>
+          <a:p>
+            <a:pPr rtl="0"/>
+            <a:r>
+              <a:rPr lang="ko-KR" altLang="en-US" sz="2200" dirty="0" smtClean="0"/>
+              <a:t>극점에서의 곡률</a:t>
+            </a:r>
+            <a:r>
+              <a:rPr lang="en-US" altLang="ko-KR" sz="2200" dirty="0" smtClean="0"/>
+              <a:t>(curvature)</a:t>
+            </a:r>
+            <a:r>
+              <a:rPr lang="ko-KR" altLang="en-US" sz="2200" dirty="0" smtClean="0"/>
+              <a:t> </a:t>
+            </a:r>
+            <a:r>
+              <a:rPr lang="en-US" altLang="ko-KR" sz="2200" dirty="0" smtClean="0"/>
+              <a:t>: </a:t>
+            </a:r>
+            <a:r>
+              <a:rPr lang="ko-KR" altLang="en-US" sz="2200" dirty="0" smtClean="0"/>
+              <a:t>매우 큼</a:t>
+            </a:r>
+            <a:endParaRPr lang="en-US" altLang="ko-KR" sz="2200" dirty="0" smtClean="0"/>
+          </a:p>
+          <a:p>
+            <a:pPr rtl="0"/>
+            <a:r>
+              <a:rPr lang="ko-KR" altLang="en-US" sz="2200" dirty="0" smtClean="0"/>
+              <a:t>방정식의 계수 값 </a:t>
+            </a:r>
+            <a:r>
+              <a:rPr lang="en-US" altLang="ko-KR" sz="2200" dirty="0" smtClean="0"/>
+              <a:t>: </a:t>
+            </a:r>
+            <a:r>
+              <a:rPr lang="ko-KR" altLang="en-US" sz="2200" dirty="0" smtClean="0"/>
+              <a:t>매우 큼</a:t>
+            </a:r>
+            <a:endParaRPr lang="en-US" altLang="ko-KR" sz="2200" dirty="0"/>
+          </a:p>
+        </p:txBody>
+      </p:sp>
+      <p:pic>
+        <p:nvPicPr>
+          <p:cNvPr id="2" name="내용 개체 틀 1"/>
+          <p:cNvPicPr>
+            <a:picLocks noGrp="1" noChangeAspect="1"/>
+          </p:cNvPicPr>
+          <p:nvPr>
+            <p:ph sz="half" idx="2"/>
+          </p:nvPr>
+        </p:nvPicPr>
+        <p:blipFill>
+          <a:blip r:embed="rId3"/>
+          <a:stretch>
+            <a:fillRect/>
+          </a:stretch>
+        </p:blipFill>
+        <p:spPr>
+          <a:xfrm>
+            <a:off x="739193" y="1660825"/>
+            <a:ext cx="5018479" cy="4831415"/>
+          </a:xfrm>
+          <a:prstGeom prst="rect">
+            <a:avLst/>
+          </a:prstGeom>
+        </p:spPr>
+      </p:pic>
+      <p:pic>
+        <p:nvPicPr>
+          <p:cNvPr id="4" name="그림 3"/>
+          <p:cNvPicPr>
+            <a:picLocks noChangeAspect="1"/>
+          </p:cNvPicPr>
+          <p:nvPr/>
+        </p:nvPicPr>
+        <p:blipFill>
+          <a:blip r:embed="rId4"/>
+          <a:stretch>
+            <a:fillRect/>
+          </a:stretch>
+        </p:blipFill>
+        <p:spPr>
+          <a:xfrm>
+            <a:off x="4851770" y="1983952"/>
+            <a:ext cx="6290702" cy="531057"/>
+          </a:xfrm>
+          <a:prstGeom prst="rect">
+            <a:avLst/>
+          </a:prstGeom>
+        </p:spPr>
+      </p:pic>
+    </p:spTree>
+    <p:extLst>
+      <p:ext uri="{BB962C8B-B14F-4D97-AF65-F5344CB8AC3E}">
+        <p14:creationId xmlns:p14="http://schemas.microsoft.com/office/powerpoint/2010/main" val="3574460062"/>
       </p:ext>
     </p:extLst>
   </p:cSld>

</xml_diff>

<commit_message>
docs: Update 5.2.2, 5.2 pptx
</commit_message>
<xml_diff>
--- a/files/ppt/5.2.2, 5.3 Regularization, Hyperparameters, Validation Sets,.pptx
+++ b/files/ppt/5.2.2, 5.3 Regularization, Hyperparameters, Validation Sets,.pptx
@@ -7858,7 +7858,11 @@
           <a:p>
             <a:r>
               <a:rPr lang="en-US" altLang="ko-KR" dirty="0"/>
-              <a:t>Hyper parameter</a:t>
+              <a:t>Hyper </a:t>
+            </a:r>
+            <a:r>
+              <a:rPr lang="en-US" altLang="ko-KR" dirty="0" smtClean="0"/>
+              <a:t>parameter, Validation set</a:t>
             </a:r>
             <a:endParaRPr lang="ko-KR" altLang="en-US" dirty="0"/>
           </a:p>
@@ -7998,7 +8002,11 @@
           <a:p>
             <a:r>
               <a:rPr lang="en-US" altLang="ko-KR" dirty="0"/>
-              <a:t>Hyper parameter</a:t>
+              <a:t>Hyper </a:t>
+            </a:r>
+            <a:r>
+              <a:rPr lang="en-US" altLang="ko-KR" dirty="0"/>
+              <a:t>parameter, Validation set</a:t>
             </a:r>
             <a:endParaRPr lang="ko-KR" altLang="en-US" dirty="0"/>
           </a:p>
@@ -8184,8 +8192,8 @@
           <a:lstStyle/>
           <a:p>
             <a:r>
-              <a:rPr lang="en-US" altLang="ko-KR" dirty="0"/>
-              <a:t>Hyper parameter</a:t>
+              <a:rPr lang="en-US" altLang="ko-KR"/>
+              <a:t>Validation set</a:t>
             </a:r>
             <a:endParaRPr lang="ko-KR" altLang="en-US" dirty="0"/>
           </a:p>
@@ -8256,11 +8264,7 @@
             </a:r>
             <a:r>
               <a:rPr lang="ko-KR" altLang="en-US" dirty="0" smtClean="0"/>
-              <a:t>모든 </a:t>
-            </a:r>
-            <a:r>
-              <a:rPr lang="ko-KR" altLang="en-US" dirty="0" smtClean="0"/>
-              <a:t>데이터 셋을 평가에 활용할 수 있다</a:t>
+              <a:t>모든 데이터 셋을 평가에 활용할 수 있다</a:t>
             </a:r>
             <a:r>
               <a:rPr lang="en-US" altLang="ko-KR" dirty="0" smtClean="0"/>

</xml_diff>